<commit_message>
updated image, background and costume loading
</commit_message>
<xml_diff>
--- a/docs/source/_images/processing/templates.pptx
+++ b/docs/source/_images/processing/templates.pptx
@@ -8,6 +8,9 @@
     <p:sldId id="256" r:id="rId3"/>
     <p:sldId id="257" r:id="rId4"/>
     <p:sldId id="258" r:id="rId5"/>
+    <p:sldId id="259" r:id="rId6"/>
+    <p:sldId id="260" r:id="rId7"/>
+    <p:sldId id="261" r:id="rId8"/>
   </p:sldIdLst>
   <p:sldSz cx="12192000" cy="6858000"/>
   <p:notesSz cx="12192000" cy="6858000"/>
@@ -3184,6 +3187,13 @@
 <file path=ppt/slides/slide1.xml><?xml version="1.0" encoding="utf-8"?>
 <p:sld xmlns:a="http://schemas.openxmlformats.org/drawingml/2006/main" xmlns:r="http://schemas.openxmlformats.org/officeDocument/2006/relationships" xmlns:p="http://schemas.openxmlformats.org/presentationml/2006/main" xmlns:m="http://schemas.openxmlformats.org/officeDocument/2006/math" xmlns:w="http://schemas.openxmlformats.org/wordprocessingml/2006/main" showMasterPhAnim="0" show="1">
   <p:cSld name="">
+    <p:bg>
+      <p:bgPr shadeToTitle="0">
+        <a:solidFill>
+          <a:schemeClr val="bg1"/>
+        </a:solidFill>
+      </p:bgPr>
+    </p:bg>
     <p:spTree>
       <p:nvGrpSpPr>
         <p:cNvPr id="1" name="" hidden="0"/>
@@ -3214,7 +3224,7 @@
           <a:graphicData uri="http://schemas.openxmlformats.org/drawingml/2006/table">
             <a:tbl>
               <a:tblPr firstRow="1" firstCol="0" lastRow="0" lastCol="0" bandRow="1" bandCol="0">
-                <a:tableStyleId>{1C70BDA8-AF47-BCB5-A079-2C0A2771EC94}</a:tableStyleId>
+                <a:tableStyleId>{4BB817D8-150B-0955-7231-5E8E44D49D6B}</a:tableStyleId>
               </a:tblPr>
               <a:tblGrid>
                 <a:gridCol w="540000"/>
@@ -3223,7 +3233,2885 @@
                 <a:gridCol w="540000"/>
                 <a:gridCol w="540000"/>
               </a:tblGrid>
-              <a:tr h="644138">
+              <a:tr h="660012">
+                <a:tc>
+                  <a:txBody>
+                    <a:bodyPr/>
+                    <a:p>
+                      <a:pPr>
+                        <a:defRPr/>
+                      </a:pPr>
+                      <a:endParaRPr/>
+                    </a:p>
+                  </a:txBody>
+                  <a:tcPr>
+                    <a:lnL w="28575" algn="ctr">
+                      <a:solidFill>
+                        <a:schemeClr val="accent1"/>
+                      </a:solidFill>
+                    </a:lnL>
+                    <a:lnR w="28575" algn="ctr">
+                      <a:solidFill>
+                        <a:schemeClr val="accent1"/>
+                      </a:solidFill>
+                    </a:lnR>
+                    <a:lnT w="28575" algn="ctr">
+                      <a:solidFill>
+                        <a:schemeClr val="accent1"/>
+                      </a:solidFill>
+                    </a:lnT>
+                    <a:lnB w="28575" algn="ctr">
+                      <a:solidFill>
+                        <a:schemeClr val="tx2">
+                          <a:lumMod val="40000"/>
+                          <a:lumOff val="60000"/>
+                        </a:schemeClr>
+                      </a:solidFill>
+                    </a:lnB>
+                  </a:tcPr>
+                </a:tc>
+                <a:tc>
+                  <a:txBody>
+                    <a:bodyPr/>
+                    <a:p>
+                      <a:pPr>
+                        <a:defRPr/>
+                      </a:pPr>
+                      <a:endParaRPr/>
+                    </a:p>
+                  </a:txBody>
+                  <a:tcPr>
+                    <a:lnL w="28575" algn="ctr">
+                      <a:solidFill>
+                        <a:schemeClr val="accent1"/>
+                      </a:solidFill>
+                    </a:lnL>
+                    <a:lnR w="28575" algn="ctr">
+                      <a:solidFill>
+                        <a:schemeClr val="tx2">
+                          <a:lumMod val="40000"/>
+                          <a:lumOff val="60000"/>
+                        </a:schemeClr>
+                      </a:solidFill>
+                    </a:lnR>
+                    <a:lnT w="28575" algn="ctr">
+                      <a:solidFill>
+                        <a:schemeClr val="tx2">
+                          <a:lumMod val="40000"/>
+                          <a:lumOff val="60000"/>
+                        </a:schemeClr>
+                      </a:solidFill>
+                    </a:lnT>
+                    <a:lnB w="28575" algn="ctr">
+                      <a:solidFill>
+                        <a:schemeClr val="tx2">
+                          <a:lumMod val="40000"/>
+                          <a:lumOff val="60000"/>
+                        </a:schemeClr>
+                      </a:solidFill>
+                    </a:lnB>
+                  </a:tcPr>
+                </a:tc>
+                <a:tc>
+                  <a:txBody>
+                    <a:bodyPr/>
+                    <a:p>
+                      <a:pPr>
+                        <a:defRPr/>
+                      </a:pPr>
+                      <a:endParaRPr/>
+                    </a:p>
+                  </a:txBody>
+                  <a:tcPr>
+                    <a:lnL w="28575" algn="ctr">
+                      <a:solidFill>
+                        <a:schemeClr val="tx2">
+                          <a:lumMod val="40000"/>
+                          <a:lumOff val="60000"/>
+                        </a:schemeClr>
+                      </a:solidFill>
+                    </a:lnL>
+                    <a:lnR w="28575" algn="ctr">
+                      <a:solidFill>
+                        <a:schemeClr val="accent1"/>
+                      </a:solidFill>
+                    </a:lnR>
+                    <a:lnT w="28575" algn="ctr">
+                      <a:solidFill>
+                        <a:schemeClr val="tx2">
+                          <a:lumMod val="40000"/>
+                          <a:lumOff val="60000"/>
+                        </a:schemeClr>
+                      </a:solidFill>
+                    </a:lnT>
+                    <a:lnB w="28575" algn="ctr">
+                      <a:solidFill>
+                        <a:schemeClr val="tx2">
+                          <a:lumMod val="40000"/>
+                          <a:lumOff val="60000"/>
+                        </a:schemeClr>
+                      </a:solidFill>
+                    </a:lnB>
+                  </a:tcPr>
+                </a:tc>
+                <a:tc>
+                  <a:txBody>
+                    <a:bodyPr/>
+                    <a:p>
+                      <a:pPr>
+                        <a:defRPr/>
+                      </a:pPr>
+                      <a:endParaRPr/>
+                    </a:p>
+                  </a:txBody>
+                  <a:tcPr>
+                    <a:lnL w="28575" algn="ctr">
+                      <a:solidFill>
+                        <a:schemeClr val="accent1"/>
+                      </a:solidFill>
+                    </a:lnL>
+                    <a:lnR w="28575" algn="ctr">
+                      <a:solidFill>
+                        <a:schemeClr val="accent1"/>
+                      </a:solidFill>
+                    </a:lnR>
+                    <a:lnT w="28575" algn="ctr">
+                      <a:solidFill>
+                        <a:schemeClr val="accent1"/>
+                      </a:solidFill>
+                    </a:lnT>
+                    <a:lnB w="28575" algn="ctr">
+                      <a:solidFill>
+                        <a:schemeClr val="tx2">
+                          <a:lumMod val="40000"/>
+                          <a:lumOff val="60000"/>
+                        </a:schemeClr>
+                      </a:solidFill>
+                    </a:lnB>
+                  </a:tcPr>
+                </a:tc>
+                <a:tc>
+                  <a:txBody>
+                    <a:bodyPr/>
+                    <a:p>
+                      <a:pPr>
+                        <a:defRPr/>
+                      </a:pPr>
+                      <a:endParaRPr/>
+                    </a:p>
+                  </a:txBody>
+                  <a:tcPr>
+                    <a:lnL w="28575" algn="ctr">
+                      <a:solidFill>
+                        <a:schemeClr val="accent1"/>
+                      </a:solidFill>
+                    </a:lnL>
+                    <a:lnR w="28575" algn="ctr">
+                      <a:solidFill>
+                        <a:schemeClr val="tx2">
+                          <a:lumMod val="40000"/>
+                          <a:lumOff val="60000"/>
+                        </a:schemeClr>
+                      </a:solidFill>
+                    </a:lnR>
+                    <a:lnT w="28575" algn="ctr">
+                      <a:solidFill>
+                        <a:schemeClr val="tx2">
+                          <a:lumMod val="40000"/>
+                          <a:lumOff val="60000"/>
+                        </a:schemeClr>
+                      </a:solidFill>
+                    </a:lnT>
+                    <a:lnB w="28575" algn="ctr">
+                      <a:solidFill>
+                        <a:schemeClr val="tx2">
+                          <a:lumMod val="40000"/>
+                          <a:lumOff val="60000"/>
+                        </a:schemeClr>
+                      </a:solidFill>
+                    </a:lnB>
+                  </a:tcPr>
+                </a:tc>
+              </a:tr>
+              <a:tr h="660012">
+                <a:tc>
+                  <a:txBody>
+                    <a:bodyPr/>
+                    <a:p>
+                      <a:pPr>
+                        <a:defRPr/>
+                      </a:pPr>
+                      <a:endParaRPr/>
+                    </a:p>
+                  </a:txBody>
+                  <a:tcPr>
+                    <a:lnL w="28575" algn="ctr">
+                      <a:solidFill>
+                        <a:schemeClr val="accent1"/>
+                      </a:solidFill>
+                    </a:lnL>
+                    <a:lnR w="28575" algn="ctr">
+                      <a:solidFill>
+                        <a:schemeClr val="accent1"/>
+                      </a:solidFill>
+                    </a:lnR>
+                    <a:lnT w="28575" algn="ctr">
+                      <a:solidFill>
+                        <a:schemeClr val="tx2">
+                          <a:lumMod val="40000"/>
+                          <a:lumOff val="60000"/>
+                        </a:schemeClr>
+                      </a:solidFill>
+                    </a:lnT>
+                    <a:lnB w="28575" algn="ctr">
+                      <a:solidFill>
+                        <a:schemeClr val="tx2">
+                          <a:lumMod val="40000"/>
+                          <a:lumOff val="60000"/>
+                        </a:schemeClr>
+                      </a:solidFill>
+                    </a:lnB>
+                  </a:tcPr>
+                </a:tc>
+                <a:tc>
+                  <a:txBody>
+                    <a:bodyPr/>
+                    <a:p>
+                      <a:pPr>
+                        <a:defRPr/>
+                      </a:pPr>
+                      <a:endParaRPr/>
+                    </a:p>
+                  </a:txBody>
+                  <a:tcPr>
+                    <a:lnL w="28575" algn="ctr">
+                      <a:solidFill>
+                        <a:schemeClr val="accent1"/>
+                      </a:solidFill>
+                    </a:lnL>
+                    <a:lnR w="28575" algn="ctr">
+                      <a:solidFill>
+                        <a:schemeClr val="tx2">
+                          <a:lumMod val="40000"/>
+                          <a:lumOff val="60000"/>
+                        </a:schemeClr>
+                      </a:solidFill>
+                    </a:lnR>
+                    <a:lnT w="28575" algn="ctr">
+                      <a:solidFill>
+                        <a:schemeClr val="tx2">
+                          <a:lumMod val="40000"/>
+                          <a:lumOff val="60000"/>
+                        </a:schemeClr>
+                      </a:solidFill>
+                    </a:lnT>
+                    <a:lnB w="28575" algn="ctr">
+                      <a:solidFill>
+                        <a:schemeClr val="tx2">
+                          <a:lumMod val="40000"/>
+                          <a:lumOff val="60000"/>
+                        </a:schemeClr>
+                      </a:solidFill>
+                    </a:lnB>
+                  </a:tcPr>
+                </a:tc>
+                <a:tc>
+                  <a:txBody>
+                    <a:bodyPr/>
+                    <a:p>
+                      <a:pPr>
+                        <a:defRPr/>
+                      </a:pPr>
+                      <a:endParaRPr/>
+                    </a:p>
+                  </a:txBody>
+                  <a:tcPr>
+                    <a:lnL w="28575" algn="ctr">
+                      <a:solidFill>
+                        <a:schemeClr val="tx2">
+                          <a:lumMod val="40000"/>
+                          <a:lumOff val="60000"/>
+                        </a:schemeClr>
+                      </a:solidFill>
+                    </a:lnL>
+                    <a:lnR w="28575" algn="ctr">
+                      <a:solidFill>
+                        <a:schemeClr val="accent1"/>
+                      </a:solidFill>
+                    </a:lnR>
+                    <a:lnT w="28575" algn="ctr">
+                      <a:solidFill>
+                        <a:schemeClr val="tx2">
+                          <a:lumMod val="40000"/>
+                          <a:lumOff val="60000"/>
+                        </a:schemeClr>
+                      </a:solidFill>
+                    </a:lnT>
+                    <a:lnB w="28575" algn="ctr">
+                      <a:solidFill>
+                        <a:schemeClr val="tx2">
+                          <a:lumMod val="40000"/>
+                          <a:lumOff val="60000"/>
+                        </a:schemeClr>
+                      </a:solidFill>
+                    </a:lnB>
+                  </a:tcPr>
+                </a:tc>
+                <a:tc>
+                  <a:txBody>
+                    <a:bodyPr/>
+                    <a:p>
+                      <a:pPr>
+                        <a:defRPr/>
+                      </a:pPr>
+                      <a:endParaRPr/>
+                    </a:p>
+                  </a:txBody>
+                  <a:tcPr>
+                    <a:lnL w="28575" algn="ctr">
+                      <a:solidFill>
+                        <a:schemeClr val="accent1"/>
+                      </a:solidFill>
+                    </a:lnL>
+                    <a:lnR w="28575" algn="ctr">
+                      <a:solidFill>
+                        <a:schemeClr val="accent1"/>
+                      </a:solidFill>
+                    </a:lnR>
+                    <a:lnT w="28575" algn="ctr">
+                      <a:solidFill>
+                        <a:schemeClr val="tx2">
+                          <a:lumMod val="40000"/>
+                          <a:lumOff val="60000"/>
+                        </a:schemeClr>
+                      </a:solidFill>
+                    </a:lnT>
+                    <a:lnB w="28575" algn="ctr">
+                      <a:solidFill>
+                        <a:schemeClr val="tx2">
+                          <a:lumMod val="40000"/>
+                          <a:lumOff val="60000"/>
+                        </a:schemeClr>
+                      </a:solidFill>
+                    </a:lnB>
+                    <a:solidFill>
+                      <a:schemeClr val="bg2">
+                        <a:lumMod val="50000"/>
+                      </a:schemeClr>
+                    </a:solidFill>
+                  </a:tcPr>
+                </a:tc>
+                <a:tc>
+                  <a:txBody>
+                    <a:bodyPr/>
+                    <a:p>
+                      <a:pPr>
+                        <a:defRPr/>
+                      </a:pPr>
+                      <a:endParaRPr/>
+                    </a:p>
+                  </a:txBody>
+                  <a:tcPr>
+                    <a:lnL w="28575" algn="ctr">
+                      <a:solidFill>
+                        <a:schemeClr val="accent1"/>
+                      </a:solidFill>
+                    </a:lnL>
+                    <a:lnR w="28575" algn="ctr">
+                      <a:solidFill>
+                        <a:schemeClr val="tx2">
+                          <a:lumMod val="40000"/>
+                          <a:lumOff val="60000"/>
+                        </a:schemeClr>
+                      </a:solidFill>
+                    </a:lnR>
+                    <a:lnT w="28575" algn="ctr">
+                      <a:solidFill>
+                        <a:schemeClr val="tx2">
+                          <a:lumMod val="40000"/>
+                          <a:lumOff val="60000"/>
+                        </a:schemeClr>
+                      </a:solidFill>
+                    </a:lnT>
+                    <a:lnB w="28575" algn="ctr">
+                      <a:solidFill>
+                        <a:schemeClr val="tx2">
+                          <a:lumMod val="40000"/>
+                          <a:lumOff val="60000"/>
+                        </a:schemeClr>
+                      </a:solidFill>
+                    </a:lnB>
+                  </a:tcPr>
+                </a:tc>
+              </a:tr>
+              <a:tr h="660012">
+                <a:tc>
+                  <a:txBody>
+                    <a:bodyPr/>
+                    <a:p>
+                      <a:pPr>
+                        <a:defRPr/>
+                      </a:pPr>
+                      <a:endParaRPr/>
+                    </a:p>
+                  </a:txBody>
+                  <a:tcPr>
+                    <a:lnL w="28575" algn="ctr">
+                      <a:solidFill>
+                        <a:schemeClr val="accent1"/>
+                      </a:solidFill>
+                    </a:lnL>
+                    <a:lnR w="28575" algn="ctr">
+                      <a:solidFill>
+                        <a:schemeClr val="accent1"/>
+                      </a:solidFill>
+                    </a:lnR>
+                    <a:lnT w="28575" algn="ctr">
+                      <a:solidFill>
+                        <a:schemeClr val="tx2">
+                          <a:lumMod val="40000"/>
+                          <a:lumOff val="60000"/>
+                        </a:schemeClr>
+                      </a:solidFill>
+                    </a:lnT>
+                    <a:lnB w="28575" algn="ctr">
+                      <a:solidFill>
+                        <a:schemeClr val="tx2">
+                          <a:lumMod val="40000"/>
+                          <a:lumOff val="60000"/>
+                        </a:schemeClr>
+                      </a:solidFill>
+                    </a:lnB>
+                  </a:tcPr>
+                </a:tc>
+                <a:tc>
+                  <a:txBody>
+                    <a:bodyPr/>
+                    <a:p>
+                      <a:pPr>
+                        <a:defRPr/>
+                      </a:pPr>
+                      <a:endParaRPr/>
+                    </a:p>
+                  </a:txBody>
+                  <a:tcPr>
+                    <a:lnL w="28575" algn="ctr">
+                      <a:solidFill>
+                        <a:schemeClr val="accent1"/>
+                      </a:solidFill>
+                    </a:lnL>
+                    <a:lnR w="28575" algn="ctr">
+                      <a:solidFill>
+                        <a:schemeClr val="tx2">
+                          <a:lumMod val="40000"/>
+                          <a:lumOff val="60000"/>
+                        </a:schemeClr>
+                      </a:solidFill>
+                    </a:lnR>
+                    <a:lnT w="28575" algn="ctr">
+                      <a:solidFill>
+                        <a:schemeClr val="tx2">
+                          <a:lumMod val="40000"/>
+                          <a:lumOff val="60000"/>
+                        </a:schemeClr>
+                      </a:solidFill>
+                    </a:lnT>
+                    <a:lnB w="28575" algn="ctr">
+                      <a:solidFill>
+                        <a:schemeClr val="tx2">
+                          <a:lumMod val="40000"/>
+                          <a:lumOff val="60000"/>
+                        </a:schemeClr>
+                      </a:solidFill>
+                    </a:lnB>
+                  </a:tcPr>
+                </a:tc>
+                <a:tc>
+                  <a:txBody>
+                    <a:bodyPr/>
+                    <a:p>
+                      <a:pPr>
+                        <a:defRPr/>
+                      </a:pPr>
+                      <a:endParaRPr/>
+                    </a:p>
+                  </a:txBody>
+                  <a:tcPr>
+                    <a:lnL w="28575" algn="ctr">
+                      <a:solidFill>
+                        <a:schemeClr val="tx2">
+                          <a:lumMod val="40000"/>
+                          <a:lumOff val="60000"/>
+                        </a:schemeClr>
+                      </a:solidFill>
+                    </a:lnL>
+                    <a:lnR w="28575" algn="ctr">
+                      <a:solidFill>
+                        <a:schemeClr val="accent1"/>
+                      </a:solidFill>
+                    </a:lnR>
+                    <a:lnT w="28575" algn="ctr">
+                      <a:solidFill>
+                        <a:schemeClr val="tx2">
+                          <a:lumMod val="40000"/>
+                          <a:lumOff val="60000"/>
+                        </a:schemeClr>
+                      </a:solidFill>
+                    </a:lnT>
+                    <a:lnB w="28575" algn="ctr">
+                      <a:solidFill>
+                        <a:schemeClr val="tx2">
+                          <a:lumMod val="40000"/>
+                          <a:lumOff val="60000"/>
+                        </a:schemeClr>
+                      </a:solidFill>
+                    </a:lnB>
+                  </a:tcPr>
+                </a:tc>
+                <a:tc>
+                  <a:txBody>
+                    <a:bodyPr/>
+                    <a:p>
+                      <a:pPr>
+                        <a:defRPr/>
+                      </a:pPr>
+                      <a:endParaRPr/>
+                    </a:p>
+                  </a:txBody>
+                  <a:tcPr>
+                    <a:lnL w="28575" algn="ctr">
+                      <a:solidFill>
+                        <a:schemeClr val="accent1"/>
+                      </a:solidFill>
+                    </a:lnL>
+                    <a:lnR w="28575" algn="ctr">
+                      <a:solidFill>
+                        <a:schemeClr val="accent1"/>
+                      </a:solidFill>
+                    </a:lnR>
+                    <a:lnT w="28575" algn="ctr">
+                      <a:solidFill>
+                        <a:schemeClr val="tx2">
+                          <a:lumMod val="40000"/>
+                          <a:lumOff val="60000"/>
+                        </a:schemeClr>
+                      </a:solidFill>
+                    </a:lnT>
+                    <a:lnB w="28575" algn="ctr">
+                      <a:solidFill>
+                        <a:schemeClr val="tx2">
+                          <a:lumMod val="40000"/>
+                          <a:lumOff val="60000"/>
+                        </a:schemeClr>
+                      </a:solidFill>
+                    </a:lnB>
+                  </a:tcPr>
+                </a:tc>
+                <a:tc>
+                  <a:txBody>
+                    <a:bodyPr/>
+                    <a:p>
+                      <a:pPr>
+                        <a:defRPr/>
+                      </a:pPr>
+                      <a:endParaRPr/>
+                    </a:p>
+                  </a:txBody>
+                  <a:tcPr>
+                    <a:lnL w="28575" algn="ctr">
+                      <a:solidFill>
+                        <a:schemeClr val="accent1"/>
+                      </a:solidFill>
+                    </a:lnL>
+                    <a:lnR w="28575" algn="ctr">
+                      <a:solidFill>
+                        <a:schemeClr val="tx2">
+                          <a:lumMod val="40000"/>
+                          <a:lumOff val="60000"/>
+                        </a:schemeClr>
+                      </a:solidFill>
+                    </a:lnR>
+                    <a:lnT w="28575" algn="ctr">
+                      <a:solidFill>
+                        <a:schemeClr val="tx2">
+                          <a:lumMod val="40000"/>
+                          <a:lumOff val="60000"/>
+                        </a:schemeClr>
+                      </a:solidFill>
+                    </a:lnT>
+                    <a:lnB w="28575" algn="ctr">
+                      <a:solidFill>
+                        <a:schemeClr val="tx2">
+                          <a:lumMod val="40000"/>
+                          <a:lumOff val="60000"/>
+                        </a:schemeClr>
+                      </a:solidFill>
+                    </a:lnB>
+                  </a:tcPr>
+                </a:tc>
+              </a:tr>
+              <a:tr h="660012">
+                <a:tc>
+                  <a:txBody>
+                    <a:bodyPr/>
+                    <a:p>
+                      <a:pPr>
+                        <a:defRPr/>
+                      </a:pPr>
+                      <a:endParaRPr/>
+                    </a:p>
+                  </a:txBody>
+                  <a:tcPr>
+                    <a:lnL w="28575" algn="ctr">
+                      <a:solidFill>
+                        <a:schemeClr val="accent1"/>
+                      </a:solidFill>
+                    </a:lnL>
+                    <a:lnR w="28575" algn="ctr">
+                      <a:solidFill>
+                        <a:schemeClr val="accent1"/>
+                      </a:solidFill>
+                    </a:lnR>
+                    <a:lnT w="28575" algn="ctr">
+                      <a:solidFill>
+                        <a:schemeClr val="tx2">
+                          <a:lumMod val="40000"/>
+                          <a:lumOff val="60000"/>
+                        </a:schemeClr>
+                      </a:solidFill>
+                    </a:lnT>
+                    <a:lnB w="28575" algn="ctr">
+                      <a:solidFill>
+                        <a:schemeClr val="tx2">
+                          <a:lumMod val="40000"/>
+                          <a:lumOff val="60000"/>
+                        </a:schemeClr>
+                      </a:solidFill>
+                    </a:lnB>
+                    <a:solidFill>
+                      <a:schemeClr val="bg2">
+                        <a:lumMod val="50000"/>
+                      </a:schemeClr>
+                    </a:solidFill>
+                  </a:tcPr>
+                </a:tc>
+                <a:tc>
+                  <a:txBody>
+                    <a:bodyPr/>
+                    <a:p>
+                      <a:pPr>
+                        <a:defRPr/>
+                      </a:pPr>
+                      <a:endParaRPr/>
+                    </a:p>
+                  </a:txBody>
+                  <a:tcPr>
+                    <a:lnL w="28575" algn="ctr">
+                      <a:solidFill>
+                        <a:schemeClr val="accent1"/>
+                      </a:solidFill>
+                    </a:lnL>
+                    <a:lnR w="28575" algn="ctr">
+                      <a:solidFill>
+                        <a:schemeClr val="tx2">
+                          <a:lumMod val="40000"/>
+                          <a:lumOff val="60000"/>
+                        </a:schemeClr>
+                      </a:solidFill>
+                    </a:lnR>
+                    <a:lnT w="28575" algn="ctr">
+                      <a:solidFill>
+                        <a:schemeClr val="tx2">
+                          <a:lumMod val="40000"/>
+                          <a:lumOff val="60000"/>
+                        </a:schemeClr>
+                      </a:solidFill>
+                    </a:lnT>
+                    <a:lnB w="28575" algn="ctr">
+                      <a:solidFill>
+                        <a:schemeClr val="tx2">
+                          <a:lumMod val="40000"/>
+                          <a:lumOff val="60000"/>
+                        </a:schemeClr>
+                      </a:solidFill>
+                    </a:lnB>
+                    <a:solidFill>
+                      <a:schemeClr val="bg1"/>
+                    </a:solidFill>
+                  </a:tcPr>
+                </a:tc>
+                <a:tc>
+                  <a:txBody>
+                    <a:bodyPr/>
+                    <a:p>
+                      <a:pPr>
+                        <a:defRPr/>
+                      </a:pPr>
+                      <a:endParaRPr/>
+                    </a:p>
+                  </a:txBody>
+                  <a:tcPr>
+                    <a:lnL w="28575" algn="ctr">
+                      <a:solidFill>
+                        <a:schemeClr val="tx2">
+                          <a:lumMod val="40000"/>
+                          <a:lumOff val="60000"/>
+                        </a:schemeClr>
+                      </a:solidFill>
+                    </a:lnL>
+                    <a:lnR w="28575" algn="ctr">
+                      <a:solidFill>
+                        <a:schemeClr val="accent1"/>
+                      </a:solidFill>
+                    </a:lnR>
+                    <a:lnT w="28575" algn="ctr">
+                      <a:solidFill>
+                        <a:schemeClr val="tx2">
+                          <a:lumMod val="40000"/>
+                          <a:lumOff val="60000"/>
+                        </a:schemeClr>
+                      </a:solidFill>
+                    </a:lnT>
+                    <a:lnB w="28575" algn="ctr">
+                      <a:solidFill>
+                        <a:schemeClr val="tx2">
+                          <a:lumMod val="40000"/>
+                          <a:lumOff val="60000"/>
+                        </a:schemeClr>
+                      </a:solidFill>
+                    </a:lnB>
+                  </a:tcPr>
+                </a:tc>
+                <a:tc>
+                  <a:txBody>
+                    <a:bodyPr/>
+                    <a:p>
+                      <a:pPr>
+                        <a:defRPr/>
+                      </a:pPr>
+                      <a:endParaRPr/>
+                    </a:p>
+                  </a:txBody>
+                  <a:tcPr>
+                    <a:lnL w="28575" algn="ctr">
+                      <a:solidFill>
+                        <a:schemeClr val="accent1"/>
+                      </a:solidFill>
+                    </a:lnL>
+                    <a:lnR w="28575" algn="ctr">
+                      <a:solidFill>
+                        <a:schemeClr val="accent1"/>
+                      </a:solidFill>
+                    </a:lnR>
+                    <a:lnT w="28575" algn="ctr">
+                      <a:solidFill>
+                        <a:schemeClr val="tx2">
+                          <a:lumMod val="40000"/>
+                          <a:lumOff val="60000"/>
+                        </a:schemeClr>
+                      </a:solidFill>
+                    </a:lnT>
+                    <a:lnB w="28575" algn="ctr">
+                      <a:solidFill>
+                        <a:schemeClr val="tx2">
+                          <a:lumMod val="40000"/>
+                          <a:lumOff val="60000"/>
+                        </a:schemeClr>
+                      </a:solidFill>
+                    </a:lnB>
+                  </a:tcPr>
+                </a:tc>
+                <a:tc>
+                  <a:txBody>
+                    <a:bodyPr/>
+                    <a:p>
+                      <a:pPr>
+                        <a:defRPr/>
+                      </a:pPr>
+                      <a:endParaRPr/>
+                    </a:p>
+                  </a:txBody>
+                  <a:tcPr>
+                    <a:lnL w="28575" algn="ctr">
+                      <a:solidFill>
+                        <a:schemeClr val="accent1"/>
+                      </a:solidFill>
+                    </a:lnL>
+                    <a:lnR w="28575" algn="ctr">
+                      <a:solidFill>
+                        <a:schemeClr val="tx2">
+                          <a:lumMod val="40000"/>
+                          <a:lumOff val="60000"/>
+                        </a:schemeClr>
+                      </a:solidFill>
+                    </a:lnR>
+                    <a:lnT w="28575" algn="ctr">
+                      <a:solidFill>
+                        <a:schemeClr val="tx2">
+                          <a:lumMod val="40000"/>
+                          <a:lumOff val="60000"/>
+                        </a:schemeClr>
+                      </a:solidFill>
+                    </a:lnT>
+                    <a:lnB w="28575" algn="ctr">
+                      <a:solidFill>
+                        <a:schemeClr val="tx2">
+                          <a:lumMod val="40000"/>
+                          <a:lumOff val="60000"/>
+                        </a:schemeClr>
+                      </a:solidFill>
+                    </a:lnB>
+                  </a:tcPr>
+                </a:tc>
+              </a:tr>
+              <a:tr h="660012">
+                <a:tc>
+                  <a:txBody>
+                    <a:bodyPr/>
+                    <a:p>
+                      <a:pPr>
+                        <a:defRPr/>
+                      </a:pPr>
+                      <a:endParaRPr/>
+                    </a:p>
+                  </a:txBody>
+                  <a:tcPr>
+                    <a:lnL w="28575" algn="ctr">
+                      <a:solidFill>
+                        <a:schemeClr val="accent1"/>
+                      </a:solidFill>
+                    </a:lnL>
+                    <a:lnR w="28575" algn="ctr">
+                      <a:solidFill>
+                        <a:schemeClr val="accent1"/>
+                      </a:solidFill>
+                    </a:lnR>
+                    <a:lnT w="28575" algn="ctr">
+                      <a:solidFill>
+                        <a:schemeClr val="tx2">
+                          <a:lumMod val="40000"/>
+                          <a:lumOff val="60000"/>
+                        </a:schemeClr>
+                      </a:solidFill>
+                    </a:lnT>
+                    <a:lnB w="28575" algn="ctr">
+                      <a:solidFill>
+                        <a:schemeClr val="accent1"/>
+                      </a:solidFill>
+                    </a:lnB>
+                  </a:tcPr>
+                </a:tc>
+                <a:tc>
+                  <a:txBody>
+                    <a:bodyPr/>
+                    <a:p>
+                      <a:pPr>
+                        <a:defRPr/>
+                      </a:pPr>
+                      <a:endParaRPr/>
+                    </a:p>
+                  </a:txBody>
+                  <a:tcPr>
+                    <a:lnL w="28575" algn="ctr">
+                      <a:solidFill>
+                        <a:schemeClr val="accent1"/>
+                      </a:solidFill>
+                    </a:lnL>
+                    <a:lnR w="28575" algn="ctr">
+                      <a:solidFill>
+                        <a:schemeClr val="tx2">
+                          <a:lumMod val="40000"/>
+                          <a:lumOff val="60000"/>
+                        </a:schemeClr>
+                      </a:solidFill>
+                    </a:lnR>
+                    <a:lnT w="28575" algn="ctr">
+                      <a:solidFill>
+                        <a:schemeClr val="tx2">
+                          <a:lumMod val="40000"/>
+                          <a:lumOff val="60000"/>
+                        </a:schemeClr>
+                      </a:solidFill>
+                    </a:lnT>
+                    <a:lnB w="28575" algn="ctr">
+                      <a:solidFill>
+                        <a:schemeClr val="tx2">
+                          <a:lumMod val="40000"/>
+                          <a:lumOff val="60000"/>
+                        </a:schemeClr>
+                      </a:solidFill>
+                    </a:lnB>
+                  </a:tcPr>
+                </a:tc>
+                <a:tc>
+                  <a:txBody>
+                    <a:bodyPr/>
+                    <a:p>
+                      <a:pPr>
+                        <a:defRPr/>
+                      </a:pPr>
+                      <a:endParaRPr/>
+                    </a:p>
+                  </a:txBody>
+                  <a:tcPr>
+                    <a:lnL w="28575" algn="ctr">
+                      <a:solidFill>
+                        <a:schemeClr val="tx2">
+                          <a:lumMod val="40000"/>
+                          <a:lumOff val="60000"/>
+                        </a:schemeClr>
+                      </a:solidFill>
+                    </a:lnL>
+                    <a:lnR w="28575" algn="ctr">
+                      <a:solidFill>
+                        <a:schemeClr val="accent1"/>
+                      </a:solidFill>
+                    </a:lnR>
+                    <a:lnT w="28575" algn="ctr">
+                      <a:solidFill>
+                        <a:schemeClr val="tx2">
+                          <a:lumMod val="40000"/>
+                          <a:lumOff val="60000"/>
+                        </a:schemeClr>
+                      </a:solidFill>
+                    </a:lnT>
+                    <a:lnB w="28575" algn="ctr">
+                      <a:solidFill>
+                        <a:schemeClr val="tx2">
+                          <a:lumMod val="40000"/>
+                          <a:lumOff val="60000"/>
+                        </a:schemeClr>
+                      </a:solidFill>
+                    </a:lnB>
+                    <a:solidFill>
+                      <a:schemeClr val="bg1"/>
+                    </a:solidFill>
+                  </a:tcPr>
+                </a:tc>
+                <a:tc>
+                  <a:txBody>
+                    <a:bodyPr/>
+                    <a:p>
+                      <a:pPr>
+                        <a:defRPr/>
+                      </a:pPr>
+                      <a:endParaRPr/>
+                    </a:p>
+                  </a:txBody>
+                  <a:tcPr>
+                    <a:lnL w="28575" algn="ctr">
+                      <a:solidFill>
+                        <a:schemeClr val="accent1"/>
+                      </a:solidFill>
+                    </a:lnL>
+                    <a:lnR w="28575" algn="ctr">
+                      <a:solidFill>
+                        <a:schemeClr val="accent1"/>
+                      </a:solidFill>
+                    </a:lnR>
+                    <a:lnT w="28575" algn="ctr">
+                      <a:solidFill>
+                        <a:schemeClr val="tx2">
+                          <a:lumMod val="40000"/>
+                          <a:lumOff val="60000"/>
+                        </a:schemeClr>
+                      </a:solidFill>
+                    </a:lnT>
+                    <a:lnB w="28575" algn="ctr">
+                      <a:solidFill>
+                        <a:schemeClr val="accent1"/>
+                      </a:solidFill>
+                    </a:lnB>
+                  </a:tcPr>
+                </a:tc>
+                <a:tc>
+                  <a:txBody>
+                    <a:bodyPr/>
+                    <a:p>
+                      <a:pPr>
+                        <a:defRPr/>
+                      </a:pPr>
+                      <a:endParaRPr/>
+                    </a:p>
+                  </a:txBody>
+                  <a:tcPr>
+                    <a:lnL w="28575" algn="ctr">
+                      <a:solidFill>
+                        <a:schemeClr val="accent1"/>
+                      </a:solidFill>
+                    </a:lnL>
+                    <a:lnR w="28575" algn="ctr">
+                      <a:solidFill>
+                        <a:schemeClr val="tx2">
+                          <a:lumMod val="40000"/>
+                          <a:lumOff val="60000"/>
+                        </a:schemeClr>
+                      </a:solidFill>
+                    </a:lnR>
+                    <a:lnT w="28575" algn="ctr">
+                      <a:solidFill>
+                        <a:schemeClr val="tx2">
+                          <a:lumMod val="40000"/>
+                          <a:lumOff val="60000"/>
+                        </a:schemeClr>
+                      </a:solidFill>
+                    </a:lnT>
+                    <a:lnB w="28575" algn="ctr">
+                      <a:solidFill>
+                        <a:schemeClr val="tx2">
+                          <a:lumMod val="40000"/>
+                          <a:lumOff val="60000"/>
+                        </a:schemeClr>
+                      </a:solidFill>
+                    </a:lnB>
+                  </a:tcPr>
+                </a:tc>
+              </a:tr>
+            </a:tbl>
+          </a:graphicData>
+        </a:graphic>
+      </p:graphicFrame>
+      <p:sp>
+        <p:nvSpPr>
+          <p:cNvPr id="903161368" name="" hidden="0"/>
+          <p:cNvSpPr/>
+          <p:nvPr isPhoto="0" userDrawn="0"/>
+        </p:nvSpPr>
+        <p:spPr bwMode="auto">
+          <a:xfrm rot="5399978" flipH="0" flipV="0">
+            <a:off x="1945338" y="664952"/>
+            <a:ext cx="826697" cy="467263"/>
+          </a:xfrm>
+          <a:prstGeom prst="rightArrow">
+            <a:avLst>
+              <a:gd name="adj1" fmla="val 50000"/>
+              <a:gd name="adj2" fmla="val 46681"/>
+            </a:avLst>
+          </a:prstGeom>
+        </p:spPr>
+        <p:style>
+          <a:lnRef idx="2">
+            <a:schemeClr val="accent1">
+              <a:shade val="50000"/>
+            </a:schemeClr>
+          </a:lnRef>
+          <a:fillRef idx="1">
+            <a:schemeClr val="accent1"/>
+          </a:fillRef>
+          <a:effectRef idx="0">
+            <a:schemeClr val="accent1"/>
+          </a:effectRef>
+          <a:fontRef idx="minor">
+            <a:schemeClr val="lt1"/>
+          </a:fontRef>
+        </p:style>
+      </p:sp>
+      <p:sp>
+        <p:nvSpPr>
+          <p:cNvPr id="2054390084" name="" hidden="0"/>
+          <p:cNvSpPr txBox="1"/>
+          <p:nvPr isPhoto="0" userDrawn="0"/>
+        </p:nvSpPr>
+        <p:spPr bwMode="auto">
+          <a:xfrm flipH="0" flipV="0">
+            <a:off x="2031998" y="119439"/>
+            <a:ext cx="716496" cy="365795"/>
+          </a:xfrm>
+          <a:prstGeom prst="rect">
+            <a:avLst/>
+          </a:prstGeom>
+          <a:noFill/>
+        </p:spPr>
+        <p:txBody>
+          <a:bodyPr vertOverflow="overflow" horzOverflow="clip" vert="horz" wrap="none" lIns="91440" tIns="45720" rIns="91440" bIns="45720" numCol="1" spcCol="0" rtlCol="0" fromWordArt="0" anchor="t" anchorCtr="0" forceAA="0" upright="0" compatLnSpc="0">
+            <a:spAutoFit/>
+          </a:bodyPr>
+          <a:p>
+            <a:pPr>
+              <a:defRPr/>
+            </a:pPr>
+            <a:r>
+              <a:rPr/>
+              <a:t>arr[0]</a:t>
+            </a:r>
+            <a:endParaRPr/>
+          </a:p>
+        </p:txBody>
+      </p:sp>
+      <p:sp>
+        <p:nvSpPr>
+          <p:cNvPr id="444891558" name="" hidden="0"/>
+          <p:cNvSpPr/>
+          <p:nvPr isPhoto="0" userDrawn="0"/>
+        </p:nvSpPr>
+        <p:spPr bwMode="auto">
+          <a:xfrm rot="5399978" flipH="0" flipV="0">
+            <a:off x="3488316" y="724618"/>
+            <a:ext cx="826697" cy="467263"/>
+          </a:xfrm>
+          <a:prstGeom prst="rightArrow">
+            <a:avLst>
+              <a:gd name="adj1" fmla="val 50000"/>
+              <a:gd name="adj2" fmla="val 50000"/>
+            </a:avLst>
+          </a:prstGeom>
+        </p:spPr>
+        <p:style>
+          <a:lnRef idx="2">
+            <a:schemeClr val="accent1">
+              <a:shade val="50000"/>
+            </a:schemeClr>
+          </a:lnRef>
+          <a:fillRef idx="1">
+            <a:schemeClr val="accent1"/>
+          </a:fillRef>
+          <a:effectRef idx="0">
+            <a:schemeClr val="accent1"/>
+          </a:effectRef>
+          <a:fontRef idx="minor">
+            <a:schemeClr val="lt1"/>
+          </a:fontRef>
+        </p:style>
+      </p:sp>
+      <p:sp>
+        <p:nvSpPr>
+          <p:cNvPr id="137187809" name="" hidden="0"/>
+          <p:cNvSpPr/>
+          <p:nvPr isPhoto="0" userDrawn="0"/>
+        </p:nvSpPr>
+        <p:spPr bwMode="auto">
+          <a:xfrm rot="5399978" flipH="0" flipV="0">
+            <a:off x="1331745" y="3324763"/>
+            <a:ext cx="377405" cy="754811"/>
+          </a:xfrm>
+          <a:prstGeom prst="upArrow">
+            <a:avLst>
+              <a:gd name="adj1" fmla="val 50000"/>
+              <a:gd name="adj2" fmla="val 50000"/>
+            </a:avLst>
+          </a:prstGeom>
+          <a:solidFill>
+            <a:schemeClr val="bg2">
+              <a:lumMod val="50000"/>
+            </a:schemeClr>
+          </a:solidFill>
+          <a:ln w="12700" cap="flat" cmpd="sng" algn="ctr">
+            <a:solidFill>
+              <a:schemeClr val="bg2">
+                <a:lumMod val="25098"/>
+              </a:schemeClr>
+            </a:solidFill>
+            <a:prstDash val="solid"/>
+            <a:miter/>
+          </a:ln>
+        </p:spPr>
+        <p:style>
+          <a:lnRef idx="2">
+            <a:schemeClr val="accent1">
+              <a:shade val="50000"/>
+            </a:schemeClr>
+          </a:lnRef>
+          <a:fillRef idx="1">
+            <a:schemeClr val="accent1"/>
+          </a:fillRef>
+          <a:effectRef idx="0">
+            <a:schemeClr val="accent1"/>
+          </a:effectRef>
+          <a:fontRef idx="minor">
+            <a:schemeClr val="lt1"/>
+          </a:fontRef>
+        </p:style>
+      </p:sp>
+      <p:sp>
+        <p:nvSpPr>
+          <p:cNvPr id="593491751" name="" hidden="0"/>
+          <p:cNvSpPr/>
+          <p:nvPr isPhoto="0" userDrawn="0"/>
+        </p:nvSpPr>
+        <p:spPr bwMode="auto">
+          <a:xfrm rot="16199969" flipH="0" flipV="0">
+            <a:off x="4638505" y="1964486"/>
+            <a:ext cx="377404" cy="754810"/>
+          </a:xfrm>
+          <a:prstGeom prst="upArrow">
+            <a:avLst>
+              <a:gd name="adj1" fmla="val 50000"/>
+              <a:gd name="adj2" fmla="val 50000"/>
+            </a:avLst>
+          </a:prstGeom>
+          <a:solidFill>
+            <a:schemeClr val="bg2">
+              <a:lumMod val="50000"/>
+            </a:schemeClr>
+          </a:solidFill>
+          <a:ln w="12700" cap="flat" cmpd="sng" algn="ctr">
+            <a:solidFill>
+              <a:schemeClr val="bg2">
+                <a:lumMod val="25098"/>
+              </a:schemeClr>
+            </a:solidFill>
+            <a:prstDash val="solid"/>
+            <a:miter/>
+          </a:ln>
+        </p:spPr>
+        <p:style>
+          <a:lnRef idx="2">
+            <a:schemeClr val="accent1">
+              <a:shade val="50000"/>
+            </a:schemeClr>
+          </a:lnRef>
+          <a:fillRef idx="1">
+            <a:schemeClr val="accent1"/>
+          </a:fillRef>
+          <a:effectRef idx="0">
+            <a:schemeClr val="accent1"/>
+          </a:effectRef>
+          <a:fontRef idx="minor">
+            <a:schemeClr val="lt1"/>
+          </a:fontRef>
+        </p:style>
+      </p:sp>
+      <p:sp>
+        <p:nvSpPr>
+          <p:cNvPr id="1216785938" name="" hidden="0"/>
+          <p:cNvSpPr txBox="1"/>
+          <p:nvPr isPhoto="0" userDrawn="0"/>
+        </p:nvSpPr>
+        <p:spPr bwMode="auto">
+          <a:xfrm flipH="0" flipV="0">
+            <a:off x="172386" y="3519271"/>
+            <a:ext cx="970656" cy="365795"/>
+          </a:xfrm>
+          <a:prstGeom prst="rect">
+            <a:avLst/>
+          </a:prstGeom>
+          <a:noFill/>
+        </p:spPr>
+        <p:txBody>
+          <a:bodyPr vertOverflow="overflow" horzOverflow="clip" vert="horz" wrap="none" lIns="91440" tIns="45720" rIns="91440" bIns="45720" numCol="1" spcCol="0" rtlCol="0" fromWordArt="0" anchor="t" anchorCtr="0" forceAA="0" upright="0" compatLnSpc="0">
+            <a:spAutoFit/>
+          </a:bodyPr>
+          <a:p>
+            <a:pPr>
+              <a:defRPr/>
+            </a:pPr>
+            <a:r>
+              <a:rPr/>
+              <a:t>arr[0][3]</a:t>
+            </a:r>
+            <a:endParaRPr/>
+          </a:p>
+        </p:txBody>
+      </p:sp>
+      <p:sp>
+        <p:nvSpPr>
+          <p:cNvPr id="256804961" name="" hidden="0"/>
+          <p:cNvSpPr txBox="1"/>
+          <p:nvPr isPhoto="0" userDrawn="0"/>
+        </p:nvSpPr>
+        <p:spPr bwMode="auto">
+          <a:xfrm flipH="0" flipV="0">
+            <a:off x="5384237" y="2164798"/>
+            <a:ext cx="970656" cy="365795"/>
+          </a:xfrm>
+          <a:prstGeom prst="rect">
+            <a:avLst/>
+          </a:prstGeom>
+          <a:noFill/>
+        </p:spPr>
+        <p:txBody>
+          <a:bodyPr vertOverflow="overflow" horzOverflow="clip" vert="horz" wrap="none" lIns="91440" tIns="45720" rIns="91440" bIns="45720" numCol="1" spcCol="0" rtlCol="0" fromWordArt="0" anchor="t" anchorCtr="0" forceAA="0" upright="0" compatLnSpc="0">
+            <a:spAutoFit/>
+          </a:bodyPr>
+          <a:p>
+            <a:pPr>
+              <a:defRPr/>
+            </a:pPr>
+            <a:r>
+              <a:rPr/>
+              <a:t>arr[3][1]</a:t>
+            </a:r>
+            <a:endParaRPr/>
+          </a:p>
+        </p:txBody>
+      </p:sp>
+      <p:sp>
+        <p:nvSpPr>
+          <p:cNvPr id="659782052" name="" hidden="0"/>
+          <p:cNvSpPr txBox="1"/>
+          <p:nvPr isPhoto="0" userDrawn="0"/>
+        </p:nvSpPr>
+        <p:spPr bwMode="auto">
+          <a:xfrm flipH="0" flipV="0">
+            <a:off x="3595536" y="119439"/>
+            <a:ext cx="716496" cy="365795"/>
+          </a:xfrm>
+          <a:prstGeom prst="rect">
+            <a:avLst/>
+          </a:prstGeom>
+          <a:noFill/>
+        </p:spPr>
+        <p:txBody>
+          <a:bodyPr vertOverflow="overflow" horzOverflow="clip" vert="horz" wrap="none" lIns="91440" tIns="45720" rIns="91440" bIns="45720" numCol="1" spcCol="0" rtlCol="0" fromWordArt="0" anchor="t" anchorCtr="0" forceAA="0" upright="0" compatLnSpc="0">
+            <a:spAutoFit/>
+          </a:bodyPr>
+          <a:p>
+            <a:pPr>
+              <a:defRPr/>
+            </a:pPr>
+            <a:r>
+              <a:rPr/>
+              <a:t>arr[3]</a:t>
+            </a:r>
+            <a:endParaRPr/>
+          </a:p>
+        </p:txBody>
+      </p:sp>
+    </p:spTree>
+  </p:cSld>
+  <p:clrMapOvr>
+    <a:masterClrMapping/>
+  </p:clrMapOvr>
+  <mc:AlternateContent xmlns:mc="http://schemas.openxmlformats.org/markup-compatibility/2006">
+    <mc:Choice xmlns:p14="http://schemas.microsoft.com/office/powerpoint/2010/main" Requires="p14">
+      <p:transition p14:dur="2000" advClick="1"/>
+    </mc:Choice>
+    <mc:Fallback>
+      <p:transition advClick="1"/>
+    </mc:Fallback>
+  </mc:AlternateContent>
+</p:sld>
+</file>
+
+<file path=ppt/slides/slide2.xml><?xml version="1.0" encoding="utf-8"?>
+<p:sld xmlns:a="http://schemas.openxmlformats.org/drawingml/2006/main" xmlns:r="http://schemas.openxmlformats.org/officeDocument/2006/relationships" xmlns:p="http://schemas.openxmlformats.org/presentationml/2006/main" xmlns:m="http://schemas.openxmlformats.org/officeDocument/2006/math" xmlns:w="http://schemas.openxmlformats.org/wordprocessingml/2006/main" showMasterPhAnim="0" show="1">
+  <p:cSld name="">
+    <p:bg>
+      <p:bgPr shadeToTitle="0">
+        <a:solidFill>
+          <a:schemeClr val="bg1"/>
+        </a:solidFill>
+      </p:bgPr>
+    </p:bg>
+    <p:spTree>
+      <p:nvGrpSpPr>
+        <p:cNvPr id="1" name="" hidden="0"/>
+        <p:cNvGrpSpPr/>
+        <p:nvPr isPhoto="0" userDrawn="0"/>
+      </p:nvGrpSpPr>
+      <p:grpSpPr bwMode="auto">
+        <a:xfrm>
+          <a:off x="0" y="0"/>
+          <a:ext cx="0" cy="0"/>
+          <a:chOff x="0" y="0"/>
+          <a:chExt cx="0" cy="0"/>
+        </a:xfrm>
+      </p:grpSpPr>
+      <p:graphicFrame>
+        <p:nvGraphicFramePr>
+          <p:cNvPr id="1878534343" name="" hidden="0"/>
+          <p:cNvGraphicFramePr>
+            <a:graphicFrameLocks xmlns:a="http://schemas.openxmlformats.org/drawingml/2006/main"/>
+          </p:cNvGraphicFramePr>
+          <p:nvPr isPhoto="0" userDrawn="0"/>
+        </p:nvGraphicFramePr>
+        <p:xfrm>
+          <a:off x="2031998" y="1371600"/>
+          <a:ext cx="8127999" cy="1346087"/>
+        </p:xfrm>
+        <a:graphic>
+          <a:graphicData uri="http://schemas.openxmlformats.org/drawingml/2006/table">
+            <a:tbl>
+              <a:tblPr firstRow="1" firstCol="0" lastRow="0" lastCol="0" bandRow="1" bandCol="0">
+                <a:tableStyleId>{4BB817D8-150B-0955-7231-5E8E44D49D6B}</a:tableStyleId>
+              </a:tblPr>
+              <a:tblGrid>
+                <a:gridCol w="540000"/>
+                <a:gridCol w="540000"/>
+                <a:gridCol w="540000"/>
+                <a:gridCol w="540000"/>
+                <a:gridCol w="540000"/>
+              </a:tblGrid>
+              <a:tr h="660011">
+                <a:tc>
+                  <a:txBody>
+                    <a:bodyPr/>
+                    <a:p>
+                      <a:pPr>
+                        <a:defRPr/>
+                      </a:pPr>
+                      <a:endParaRPr/>
+                    </a:p>
+                  </a:txBody>
+                  <a:tcPr>
+                    <a:lnL w="28575" algn="ctr">
+                      <a:solidFill>
+                        <a:schemeClr val="accent1"/>
+                      </a:solidFill>
+                    </a:lnL>
+                    <a:lnR w="28575" algn="ctr">
+                      <a:solidFill>
+                        <a:schemeClr val="accent1"/>
+                      </a:solidFill>
+                    </a:lnR>
+                    <a:lnT w="28575" algn="ctr">
+                      <a:solidFill>
+                        <a:schemeClr val="accent1"/>
+                      </a:solidFill>
+                    </a:lnT>
+                    <a:lnB w="28575" algn="ctr">
+                      <a:solidFill>
+                        <a:schemeClr val="tx2">
+                          <a:lumMod val="40000"/>
+                          <a:lumOff val="60000"/>
+                        </a:schemeClr>
+                      </a:solidFill>
+                    </a:lnB>
+                  </a:tcPr>
+                </a:tc>
+                <a:tc>
+                  <a:txBody>
+                    <a:bodyPr/>
+                    <a:p>
+                      <a:pPr>
+                        <a:defRPr/>
+                      </a:pPr>
+                      <a:endParaRPr/>
+                    </a:p>
+                  </a:txBody>
+                  <a:tcPr>
+                    <a:lnL w="28575" algn="ctr">
+                      <a:solidFill>
+                        <a:schemeClr val="accent1"/>
+                      </a:solidFill>
+                    </a:lnL>
+                    <a:lnR w="28575" algn="ctr">
+                      <a:solidFill>
+                        <a:schemeClr val="tx2">
+                          <a:lumMod val="40000"/>
+                          <a:lumOff val="60000"/>
+                        </a:schemeClr>
+                      </a:solidFill>
+                    </a:lnR>
+                    <a:lnT w="28575" algn="ctr">
+                      <a:solidFill>
+                        <a:schemeClr val="tx2">
+                          <a:lumMod val="40000"/>
+                          <a:lumOff val="60000"/>
+                        </a:schemeClr>
+                      </a:solidFill>
+                    </a:lnT>
+                    <a:lnB w="28575" algn="ctr">
+                      <a:solidFill>
+                        <a:schemeClr val="tx2">
+                          <a:lumMod val="40000"/>
+                          <a:lumOff val="60000"/>
+                        </a:schemeClr>
+                      </a:solidFill>
+                    </a:lnB>
+                  </a:tcPr>
+                </a:tc>
+                <a:tc>
+                  <a:txBody>
+                    <a:bodyPr/>
+                    <a:p>
+                      <a:pPr>
+                        <a:defRPr/>
+                      </a:pPr>
+                      <a:endParaRPr/>
+                    </a:p>
+                  </a:txBody>
+                  <a:tcPr>
+                    <a:lnL w="28575" algn="ctr">
+                      <a:solidFill>
+                        <a:schemeClr val="tx2">
+                          <a:lumMod val="40000"/>
+                          <a:lumOff val="60000"/>
+                        </a:schemeClr>
+                      </a:solidFill>
+                    </a:lnL>
+                    <a:lnR w="28575" algn="ctr">
+                      <a:solidFill>
+                        <a:schemeClr val="accent1"/>
+                      </a:solidFill>
+                    </a:lnR>
+                    <a:lnT w="28575" algn="ctr">
+                      <a:solidFill>
+                        <a:schemeClr val="tx2">
+                          <a:lumMod val="40000"/>
+                          <a:lumOff val="60000"/>
+                        </a:schemeClr>
+                      </a:solidFill>
+                    </a:lnT>
+                    <a:lnB w="28575" algn="ctr">
+                      <a:solidFill>
+                        <a:schemeClr val="tx2">
+                          <a:lumMod val="40000"/>
+                          <a:lumOff val="60000"/>
+                        </a:schemeClr>
+                      </a:solidFill>
+                    </a:lnB>
+                  </a:tcPr>
+                </a:tc>
+                <a:tc>
+                  <a:txBody>
+                    <a:bodyPr/>
+                    <a:p>
+                      <a:pPr>
+                        <a:defRPr/>
+                      </a:pPr>
+                      <a:endParaRPr/>
+                    </a:p>
+                  </a:txBody>
+                  <a:tcPr>
+                    <a:lnL w="28575" algn="ctr">
+                      <a:solidFill>
+                        <a:schemeClr val="accent1"/>
+                      </a:solidFill>
+                    </a:lnL>
+                    <a:lnR w="28575" algn="ctr">
+                      <a:solidFill>
+                        <a:schemeClr val="accent1"/>
+                      </a:solidFill>
+                    </a:lnR>
+                    <a:lnT w="28575" algn="ctr">
+                      <a:solidFill>
+                        <a:schemeClr val="accent1"/>
+                      </a:solidFill>
+                    </a:lnT>
+                    <a:lnB w="28575" algn="ctr">
+                      <a:solidFill>
+                        <a:schemeClr val="tx2">
+                          <a:lumMod val="40000"/>
+                          <a:lumOff val="60000"/>
+                        </a:schemeClr>
+                      </a:solidFill>
+                    </a:lnB>
+                  </a:tcPr>
+                </a:tc>
+                <a:tc>
+                  <a:txBody>
+                    <a:bodyPr/>
+                    <a:p>
+                      <a:pPr>
+                        <a:defRPr/>
+                      </a:pPr>
+                      <a:endParaRPr/>
+                    </a:p>
+                  </a:txBody>
+                  <a:tcPr>
+                    <a:lnL w="28575" algn="ctr">
+                      <a:solidFill>
+                        <a:schemeClr val="accent1"/>
+                      </a:solidFill>
+                    </a:lnL>
+                    <a:lnR w="28575" algn="ctr">
+                      <a:solidFill>
+                        <a:schemeClr val="tx2">
+                          <a:lumMod val="40000"/>
+                          <a:lumOff val="60000"/>
+                        </a:schemeClr>
+                      </a:solidFill>
+                    </a:lnR>
+                    <a:lnT w="28575" algn="ctr">
+                      <a:solidFill>
+                        <a:schemeClr val="tx2">
+                          <a:lumMod val="40000"/>
+                          <a:lumOff val="60000"/>
+                        </a:schemeClr>
+                      </a:solidFill>
+                    </a:lnT>
+                    <a:lnB w="28575" algn="ctr">
+                      <a:solidFill>
+                        <a:schemeClr val="tx2">
+                          <a:lumMod val="40000"/>
+                          <a:lumOff val="60000"/>
+                        </a:schemeClr>
+                      </a:solidFill>
+                    </a:lnB>
+                  </a:tcPr>
+                </a:tc>
+              </a:tr>
+              <a:tr h="660011">
+                <a:tc>
+                  <a:txBody>
+                    <a:bodyPr/>
+                    <a:p>
+                      <a:pPr>
+                        <a:defRPr/>
+                      </a:pPr>
+                      <a:endParaRPr/>
+                    </a:p>
+                  </a:txBody>
+                  <a:tcPr>
+                    <a:lnL w="28575" algn="ctr">
+                      <a:solidFill>
+                        <a:schemeClr val="accent1"/>
+                      </a:solidFill>
+                    </a:lnL>
+                    <a:lnR w="28575" algn="ctr">
+                      <a:solidFill>
+                        <a:schemeClr val="accent1"/>
+                      </a:solidFill>
+                    </a:lnR>
+                    <a:lnT w="28575" algn="ctr">
+                      <a:solidFill>
+                        <a:schemeClr val="tx2">
+                          <a:lumMod val="40000"/>
+                          <a:lumOff val="60000"/>
+                        </a:schemeClr>
+                      </a:solidFill>
+                    </a:lnT>
+                    <a:lnB w="28575" algn="ctr">
+                      <a:solidFill>
+                        <a:schemeClr val="tx2">
+                          <a:lumMod val="40000"/>
+                          <a:lumOff val="60000"/>
+                        </a:schemeClr>
+                      </a:solidFill>
+                    </a:lnB>
+                  </a:tcPr>
+                </a:tc>
+                <a:tc>
+                  <a:txBody>
+                    <a:bodyPr/>
+                    <a:p>
+                      <a:pPr>
+                        <a:defRPr/>
+                      </a:pPr>
+                      <a:endParaRPr/>
+                    </a:p>
+                  </a:txBody>
+                  <a:tcPr>
+                    <a:lnL w="28575" algn="ctr">
+                      <a:solidFill>
+                        <a:schemeClr val="accent1"/>
+                      </a:solidFill>
+                    </a:lnL>
+                    <a:lnR w="28575" algn="ctr">
+                      <a:solidFill>
+                        <a:schemeClr val="tx2">
+                          <a:lumMod val="40000"/>
+                          <a:lumOff val="60000"/>
+                        </a:schemeClr>
+                      </a:solidFill>
+                    </a:lnR>
+                    <a:lnT w="28575" algn="ctr">
+                      <a:solidFill>
+                        <a:schemeClr val="tx2">
+                          <a:lumMod val="40000"/>
+                          <a:lumOff val="60000"/>
+                        </a:schemeClr>
+                      </a:solidFill>
+                    </a:lnT>
+                    <a:lnB w="28575" algn="ctr">
+                      <a:solidFill>
+                        <a:schemeClr val="tx2">
+                          <a:lumMod val="40000"/>
+                          <a:lumOff val="60000"/>
+                        </a:schemeClr>
+                      </a:solidFill>
+                    </a:lnB>
+                  </a:tcPr>
+                </a:tc>
+                <a:tc>
+                  <a:txBody>
+                    <a:bodyPr/>
+                    <a:p>
+                      <a:pPr>
+                        <a:defRPr/>
+                      </a:pPr>
+                      <a:endParaRPr/>
+                    </a:p>
+                  </a:txBody>
+                  <a:tcPr>
+                    <a:lnL w="28575" algn="ctr">
+                      <a:solidFill>
+                        <a:schemeClr val="tx2">
+                          <a:lumMod val="40000"/>
+                          <a:lumOff val="60000"/>
+                        </a:schemeClr>
+                      </a:solidFill>
+                    </a:lnL>
+                    <a:lnR w="28575" algn="ctr">
+                      <a:solidFill>
+                        <a:schemeClr val="accent1"/>
+                      </a:solidFill>
+                    </a:lnR>
+                    <a:lnT w="28575" algn="ctr">
+                      <a:solidFill>
+                        <a:schemeClr val="tx2">
+                          <a:lumMod val="40000"/>
+                          <a:lumOff val="60000"/>
+                        </a:schemeClr>
+                      </a:solidFill>
+                    </a:lnT>
+                    <a:lnB w="28575" algn="ctr">
+                      <a:solidFill>
+                        <a:schemeClr val="tx2">
+                          <a:lumMod val="40000"/>
+                          <a:lumOff val="60000"/>
+                        </a:schemeClr>
+                      </a:solidFill>
+                    </a:lnB>
+                  </a:tcPr>
+                </a:tc>
+                <a:tc>
+                  <a:txBody>
+                    <a:bodyPr/>
+                    <a:p>
+                      <a:pPr>
+                        <a:defRPr/>
+                      </a:pPr>
+                      <a:endParaRPr/>
+                    </a:p>
+                  </a:txBody>
+                  <a:tcPr>
+                    <a:lnL w="28575" algn="ctr">
+                      <a:solidFill>
+                        <a:schemeClr val="accent1"/>
+                      </a:solidFill>
+                    </a:lnL>
+                    <a:lnR w="28575" algn="ctr">
+                      <a:solidFill>
+                        <a:schemeClr val="accent1"/>
+                      </a:solidFill>
+                    </a:lnR>
+                    <a:lnT w="28575" algn="ctr">
+                      <a:solidFill>
+                        <a:schemeClr val="tx2">
+                          <a:lumMod val="40000"/>
+                          <a:lumOff val="60000"/>
+                        </a:schemeClr>
+                      </a:solidFill>
+                    </a:lnT>
+                    <a:lnB w="28575" algn="ctr">
+                      <a:solidFill>
+                        <a:schemeClr val="tx2">
+                          <a:lumMod val="40000"/>
+                          <a:lumOff val="60000"/>
+                        </a:schemeClr>
+                      </a:solidFill>
+                    </a:lnB>
+                    <a:solidFill>
+                      <a:schemeClr val="bg2">
+                        <a:lumMod val="50000"/>
+                      </a:schemeClr>
+                    </a:solidFill>
+                  </a:tcPr>
+                </a:tc>
+                <a:tc>
+                  <a:txBody>
+                    <a:bodyPr/>
+                    <a:p>
+                      <a:pPr>
+                        <a:defRPr/>
+                      </a:pPr>
+                      <a:endParaRPr/>
+                    </a:p>
+                  </a:txBody>
+                  <a:tcPr>
+                    <a:lnL w="28575" algn="ctr">
+                      <a:solidFill>
+                        <a:schemeClr val="accent1"/>
+                      </a:solidFill>
+                    </a:lnL>
+                    <a:lnR w="28575" algn="ctr">
+                      <a:solidFill>
+                        <a:schemeClr val="tx2">
+                          <a:lumMod val="40000"/>
+                          <a:lumOff val="60000"/>
+                        </a:schemeClr>
+                      </a:solidFill>
+                    </a:lnR>
+                    <a:lnT w="28575" algn="ctr">
+                      <a:solidFill>
+                        <a:schemeClr val="tx2">
+                          <a:lumMod val="40000"/>
+                          <a:lumOff val="60000"/>
+                        </a:schemeClr>
+                      </a:solidFill>
+                    </a:lnT>
+                    <a:lnB w="28575" algn="ctr">
+                      <a:solidFill>
+                        <a:schemeClr val="tx2">
+                          <a:lumMod val="40000"/>
+                          <a:lumOff val="60000"/>
+                        </a:schemeClr>
+                      </a:solidFill>
+                    </a:lnB>
+                  </a:tcPr>
+                </a:tc>
+              </a:tr>
+              <a:tr h="660011">
+                <a:tc>
+                  <a:txBody>
+                    <a:bodyPr/>
+                    <a:p>
+                      <a:pPr>
+                        <a:defRPr/>
+                      </a:pPr>
+                      <a:endParaRPr/>
+                    </a:p>
+                  </a:txBody>
+                  <a:tcPr>
+                    <a:lnL w="28575" algn="ctr">
+                      <a:solidFill>
+                        <a:schemeClr val="accent1"/>
+                      </a:solidFill>
+                    </a:lnL>
+                    <a:lnR w="28575" algn="ctr">
+                      <a:solidFill>
+                        <a:schemeClr val="accent1"/>
+                      </a:solidFill>
+                    </a:lnR>
+                    <a:lnT w="28575" algn="ctr">
+                      <a:solidFill>
+                        <a:schemeClr val="tx2">
+                          <a:lumMod val="40000"/>
+                          <a:lumOff val="60000"/>
+                        </a:schemeClr>
+                      </a:solidFill>
+                    </a:lnT>
+                    <a:lnB w="28575" algn="ctr">
+                      <a:solidFill>
+                        <a:schemeClr val="tx2">
+                          <a:lumMod val="40000"/>
+                          <a:lumOff val="60000"/>
+                        </a:schemeClr>
+                      </a:solidFill>
+                    </a:lnB>
+                  </a:tcPr>
+                </a:tc>
+                <a:tc>
+                  <a:txBody>
+                    <a:bodyPr/>
+                    <a:p>
+                      <a:pPr>
+                        <a:defRPr/>
+                      </a:pPr>
+                      <a:endParaRPr/>
+                    </a:p>
+                  </a:txBody>
+                  <a:tcPr>
+                    <a:lnL w="28575" algn="ctr">
+                      <a:solidFill>
+                        <a:schemeClr val="accent1"/>
+                      </a:solidFill>
+                    </a:lnL>
+                    <a:lnR w="28575" algn="ctr">
+                      <a:solidFill>
+                        <a:schemeClr val="tx2">
+                          <a:lumMod val="40000"/>
+                          <a:lumOff val="60000"/>
+                        </a:schemeClr>
+                      </a:solidFill>
+                    </a:lnR>
+                    <a:lnT w="28575" algn="ctr">
+                      <a:solidFill>
+                        <a:schemeClr val="tx2">
+                          <a:lumMod val="40000"/>
+                          <a:lumOff val="60000"/>
+                        </a:schemeClr>
+                      </a:solidFill>
+                    </a:lnT>
+                    <a:lnB w="28575" algn="ctr">
+                      <a:solidFill>
+                        <a:schemeClr val="tx2">
+                          <a:lumMod val="40000"/>
+                          <a:lumOff val="60000"/>
+                        </a:schemeClr>
+                      </a:solidFill>
+                    </a:lnB>
+                  </a:tcPr>
+                </a:tc>
+                <a:tc>
+                  <a:txBody>
+                    <a:bodyPr/>
+                    <a:p>
+                      <a:pPr>
+                        <a:defRPr/>
+                      </a:pPr>
+                      <a:endParaRPr/>
+                    </a:p>
+                  </a:txBody>
+                  <a:tcPr>
+                    <a:lnL w="28575" algn="ctr">
+                      <a:solidFill>
+                        <a:schemeClr val="tx2">
+                          <a:lumMod val="40000"/>
+                          <a:lumOff val="60000"/>
+                        </a:schemeClr>
+                      </a:solidFill>
+                    </a:lnL>
+                    <a:lnR w="28575" algn="ctr">
+                      <a:solidFill>
+                        <a:schemeClr val="accent1"/>
+                      </a:solidFill>
+                    </a:lnR>
+                    <a:lnT w="28575" algn="ctr">
+                      <a:solidFill>
+                        <a:schemeClr val="tx2">
+                          <a:lumMod val="40000"/>
+                          <a:lumOff val="60000"/>
+                        </a:schemeClr>
+                      </a:solidFill>
+                    </a:lnT>
+                    <a:lnB w="28575" algn="ctr">
+                      <a:solidFill>
+                        <a:schemeClr val="tx2">
+                          <a:lumMod val="40000"/>
+                          <a:lumOff val="60000"/>
+                        </a:schemeClr>
+                      </a:solidFill>
+                    </a:lnB>
+                  </a:tcPr>
+                </a:tc>
+                <a:tc>
+                  <a:txBody>
+                    <a:bodyPr/>
+                    <a:p>
+                      <a:pPr>
+                        <a:defRPr/>
+                      </a:pPr>
+                      <a:endParaRPr/>
+                    </a:p>
+                  </a:txBody>
+                  <a:tcPr>
+                    <a:lnL w="28575" algn="ctr">
+                      <a:solidFill>
+                        <a:schemeClr val="accent1"/>
+                      </a:solidFill>
+                    </a:lnL>
+                    <a:lnR w="28575" algn="ctr">
+                      <a:solidFill>
+                        <a:schemeClr val="accent1"/>
+                      </a:solidFill>
+                    </a:lnR>
+                    <a:lnT w="28575" algn="ctr">
+                      <a:solidFill>
+                        <a:schemeClr val="tx2">
+                          <a:lumMod val="40000"/>
+                          <a:lumOff val="60000"/>
+                        </a:schemeClr>
+                      </a:solidFill>
+                    </a:lnT>
+                    <a:lnB w="28575" algn="ctr">
+                      <a:solidFill>
+                        <a:schemeClr val="tx2">
+                          <a:lumMod val="40000"/>
+                          <a:lumOff val="60000"/>
+                        </a:schemeClr>
+                      </a:solidFill>
+                    </a:lnB>
+                  </a:tcPr>
+                </a:tc>
+                <a:tc>
+                  <a:txBody>
+                    <a:bodyPr/>
+                    <a:p>
+                      <a:pPr>
+                        <a:defRPr/>
+                      </a:pPr>
+                      <a:endParaRPr/>
+                    </a:p>
+                  </a:txBody>
+                  <a:tcPr>
+                    <a:lnL w="28575" algn="ctr">
+                      <a:solidFill>
+                        <a:schemeClr val="accent1"/>
+                      </a:solidFill>
+                    </a:lnL>
+                    <a:lnR w="28575" algn="ctr">
+                      <a:solidFill>
+                        <a:schemeClr val="tx2">
+                          <a:lumMod val="40000"/>
+                          <a:lumOff val="60000"/>
+                        </a:schemeClr>
+                      </a:solidFill>
+                    </a:lnR>
+                    <a:lnT w="28575" algn="ctr">
+                      <a:solidFill>
+                        <a:schemeClr val="tx2">
+                          <a:lumMod val="40000"/>
+                          <a:lumOff val="60000"/>
+                        </a:schemeClr>
+                      </a:solidFill>
+                    </a:lnT>
+                    <a:lnB w="28575" algn="ctr">
+                      <a:solidFill>
+                        <a:schemeClr val="tx2">
+                          <a:lumMod val="40000"/>
+                          <a:lumOff val="60000"/>
+                        </a:schemeClr>
+                      </a:solidFill>
+                    </a:lnB>
+                  </a:tcPr>
+                </a:tc>
+              </a:tr>
+              <a:tr h="660011">
+                <a:tc>
+                  <a:txBody>
+                    <a:bodyPr/>
+                    <a:p>
+                      <a:pPr>
+                        <a:defRPr/>
+                      </a:pPr>
+                      <a:endParaRPr/>
+                    </a:p>
+                  </a:txBody>
+                  <a:tcPr>
+                    <a:lnL w="28575" algn="ctr">
+                      <a:solidFill>
+                        <a:schemeClr val="accent1"/>
+                      </a:solidFill>
+                    </a:lnL>
+                    <a:lnR w="28575" algn="ctr">
+                      <a:solidFill>
+                        <a:schemeClr val="accent1"/>
+                      </a:solidFill>
+                    </a:lnR>
+                    <a:lnT w="28575" algn="ctr">
+                      <a:solidFill>
+                        <a:schemeClr val="tx2">
+                          <a:lumMod val="40000"/>
+                          <a:lumOff val="60000"/>
+                        </a:schemeClr>
+                      </a:solidFill>
+                    </a:lnT>
+                    <a:lnB w="28575" algn="ctr">
+                      <a:solidFill>
+                        <a:schemeClr val="tx2">
+                          <a:lumMod val="40000"/>
+                          <a:lumOff val="60000"/>
+                        </a:schemeClr>
+                      </a:solidFill>
+                    </a:lnB>
+                    <a:solidFill>
+                      <a:schemeClr val="bg1"/>
+                    </a:solidFill>
+                  </a:tcPr>
+                </a:tc>
+                <a:tc>
+                  <a:txBody>
+                    <a:bodyPr/>
+                    <a:p>
+                      <a:pPr>
+                        <a:defRPr/>
+                      </a:pPr>
+                      <a:endParaRPr/>
+                    </a:p>
+                  </a:txBody>
+                  <a:tcPr>
+                    <a:lnL w="28575" algn="ctr">
+                      <a:solidFill>
+                        <a:schemeClr val="accent1"/>
+                      </a:solidFill>
+                    </a:lnL>
+                    <a:lnR w="28575" algn="ctr">
+                      <a:solidFill>
+                        <a:schemeClr val="tx2">
+                          <a:lumMod val="40000"/>
+                          <a:lumOff val="60000"/>
+                        </a:schemeClr>
+                      </a:solidFill>
+                    </a:lnR>
+                    <a:lnT w="28575" algn="ctr">
+                      <a:solidFill>
+                        <a:schemeClr val="tx2">
+                          <a:lumMod val="40000"/>
+                          <a:lumOff val="60000"/>
+                        </a:schemeClr>
+                      </a:solidFill>
+                    </a:lnT>
+                    <a:lnB w="28575" algn="ctr">
+                      <a:solidFill>
+                        <a:schemeClr val="tx2">
+                          <a:lumMod val="40000"/>
+                          <a:lumOff val="60000"/>
+                        </a:schemeClr>
+                      </a:solidFill>
+                    </a:lnB>
+                    <a:solidFill>
+                      <a:schemeClr val="bg1"/>
+                    </a:solidFill>
+                  </a:tcPr>
+                </a:tc>
+                <a:tc>
+                  <a:txBody>
+                    <a:bodyPr/>
+                    <a:p>
+                      <a:pPr>
+                        <a:defRPr/>
+                      </a:pPr>
+                      <a:endParaRPr/>
+                    </a:p>
+                  </a:txBody>
+                  <a:tcPr>
+                    <a:lnL w="28575" algn="ctr">
+                      <a:solidFill>
+                        <a:schemeClr val="tx2">
+                          <a:lumMod val="40000"/>
+                          <a:lumOff val="60000"/>
+                        </a:schemeClr>
+                      </a:solidFill>
+                    </a:lnL>
+                    <a:lnR w="28575" algn="ctr">
+                      <a:solidFill>
+                        <a:schemeClr val="accent1"/>
+                      </a:solidFill>
+                    </a:lnR>
+                    <a:lnT w="28575" algn="ctr">
+                      <a:solidFill>
+                        <a:schemeClr val="tx2">
+                          <a:lumMod val="40000"/>
+                          <a:lumOff val="60000"/>
+                        </a:schemeClr>
+                      </a:solidFill>
+                    </a:lnT>
+                    <a:lnB w="28575" algn="ctr">
+                      <a:solidFill>
+                        <a:schemeClr val="tx2">
+                          <a:lumMod val="40000"/>
+                          <a:lumOff val="60000"/>
+                        </a:schemeClr>
+                      </a:solidFill>
+                    </a:lnB>
+                  </a:tcPr>
+                </a:tc>
+                <a:tc>
+                  <a:txBody>
+                    <a:bodyPr/>
+                    <a:p>
+                      <a:pPr>
+                        <a:defRPr/>
+                      </a:pPr>
+                      <a:endParaRPr/>
+                    </a:p>
+                  </a:txBody>
+                  <a:tcPr>
+                    <a:lnL w="28575" algn="ctr">
+                      <a:solidFill>
+                        <a:schemeClr val="accent1"/>
+                      </a:solidFill>
+                    </a:lnL>
+                    <a:lnR w="28575" algn="ctr">
+                      <a:solidFill>
+                        <a:schemeClr val="accent1"/>
+                      </a:solidFill>
+                    </a:lnR>
+                    <a:lnT w="28575" algn="ctr">
+                      <a:solidFill>
+                        <a:schemeClr val="tx2">
+                          <a:lumMod val="40000"/>
+                          <a:lumOff val="60000"/>
+                        </a:schemeClr>
+                      </a:solidFill>
+                    </a:lnT>
+                    <a:lnB w="28575" algn="ctr">
+                      <a:solidFill>
+                        <a:schemeClr val="tx2">
+                          <a:lumMod val="40000"/>
+                          <a:lumOff val="60000"/>
+                        </a:schemeClr>
+                      </a:solidFill>
+                    </a:lnB>
+                  </a:tcPr>
+                </a:tc>
+                <a:tc>
+                  <a:txBody>
+                    <a:bodyPr/>
+                    <a:p>
+                      <a:pPr>
+                        <a:defRPr/>
+                      </a:pPr>
+                      <a:endParaRPr/>
+                    </a:p>
+                  </a:txBody>
+                  <a:tcPr>
+                    <a:lnL w="28575" algn="ctr">
+                      <a:solidFill>
+                        <a:schemeClr val="accent1"/>
+                      </a:solidFill>
+                    </a:lnL>
+                    <a:lnR w="28575" algn="ctr">
+                      <a:solidFill>
+                        <a:schemeClr val="tx2">
+                          <a:lumMod val="40000"/>
+                          <a:lumOff val="60000"/>
+                        </a:schemeClr>
+                      </a:solidFill>
+                    </a:lnR>
+                    <a:lnT w="28575" algn="ctr">
+                      <a:solidFill>
+                        <a:schemeClr val="tx2">
+                          <a:lumMod val="40000"/>
+                          <a:lumOff val="60000"/>
+                        </a:schemeClr>
+                      </a:solidFill>
+                    </a:lnT>
+                    <a:lnB w="28575" algn="ctr">
+                      <a:solidFill>
+                        <a:schemeClr val="tx2">
+                          <a:lumMod val="40000"/>
+                          <a:lumOff val="60000"/>
+                        </a:schemeClr>
+                      </a:solidFill>
+                    </a:lnB>
+                  </a:tcPr>
+                </a:tc>
+              </a:tr>
+              <a:tr h="660011">
+                <a:tc>
+                  <a:txBody>
+                    <a:bodyPr/>
+                    <a:p>
+                      <a:pPr>
+                        <a:defRPr/>
+                      </a:pPr>
+                      <a:endParaRPr/>
+                    </a:p>
+                  </a:txBody>
+                  <a:tcPr>
+                    <a:lnL w="28575" algn="ctr">
+                      <a:solidFill>
+                        <a:schemeClr val="accent1"/>
+                      </a:solidFill>
+                    </a:lnL>
+                    <a:lnR w="28575" algn="ctr">
+                      <a:solidFill>
+                        <a:schemeClr val="accent1"/>
+                      </a:solidFill>
+                    </a:lnR>
+                    <a:lnT w="28575" algn="ctr">
+                      <a:solidFill>
+                        <a:schemeClr val="tx2">
+                          <a:lumMod val="40000"/>
+                          <a:lumOff val="60000"/>
+                        </a:schemeClr>
+                      </a:solidFill>
+                    </a:lnT>
+                    <a:lnB w="28575" algn="ctr">
+                      <a:solidFill>
+                        <a:schemeClr val="accent1"/>
+                      </a:solidFill>
+                    </a:lnB>
+                  </a:tcPr>
+                </a:tc>
+                <a:tc>
+                  <a:txBody>
+                    <a:bodyPr/>
+                    <a:p>
+                      <a:pPr>
+                        <a:defRPr/>
+                      </a:pPr>
+                      <a:endParaRPr/>
+                    </a:p>
+                  </a:txBody>
+                  <a:tcPr>
+                    <a:lnL w="28575" algn="ctr">
+                      <a:solidFill>
+                        <a:schemeClr val="accent1"/>
+                      </a:solidFill>
+                    </a:lnL>
+                    <a:lnR w="28575" algn="ctr">
+                      <a:solidFill>
+                        <a:schemeClr val="tx2">
+                          <a:lumMod val="40000"/>
+                          <a:lumOff val="60000"/>
+                        </a:schemeClr>
+                      </a:solidFill>
+                    </a:lnR>
+                    <a:lnT w="28575" algn="ctr">
+                      <a:solidFill>
+                        <a:schemeClr val="tx2">
+                          <a:lumMod val="40000"/>
+                          <a:lumOff val="60000"/>
+                        </a:schemeClr>
+                      </a:solidFill>
+                    </a:lnT>
+                    <a:lnB w="28575" algn="ctr">
+                      <a:solidFill>
+                        <a:schemeClr val="tx2">
+                          <a:lumMod val="40000"/>
+                          <a:lumOff val="60000"/>
+                        </a:schemeClr>
+                      </a:solidFill>
+                    </a:lnB>
+                  </a:tcPr>
+                </a:tc>
+                <a:tc>
+                  <a:txBody>
+                    <a:bodyPr/>
+                    <a:p>
+                      <a:pPr>
+                        <a:defRPr/>
+                      </a:pPr>
+                      <a:endParaRPr/>
+                    </a:p>
+                  </a:txBody>
+                  <a:tcPr>
+                    <a:lnL w="28575" algn="ctr">
+                      <a:solidFill>
+                        <a:schemeClr val="tx2">
+                          <a:lumMod val="40000"/>
+                          <a:lumOff val="60000"/>
+                        </a:schemeClr>
+                      </a:solidFill>
+                    </a:lnL>
+                    <a:lnR w="28575" algn="ctr">
+                      <a:solidFill>
+                        <a:schemeClr val="accent1"/>
+                      </a:solidFill>
+                    </a:lnR>
+                    <a:lnT w="28575" algn="ctr">
+                      <a:solidFill>
+                        <a:schemeClr val="tx2">
+                          <a:lumMod val="40000"/>
+                          <a:lumOff val="60000"/>
+                        </a:schemeClr>
+                      </a:solidFill>
+                    </a:lnT>
+                    <a:lnB w="28575" algn="ctr">
+                      <a:solidFill>
+                        <a:schemeClr val="tx2">
+                          <a:lumMod val="40000"/>
+                          <a:lumOff val="60000"/>
+                        </a:schemeClr>
+                      </a:solidFill>
+                    </a:lnB>
+                    <a:solidFill>
+                      <a:schemeClr val="bg1"/>
+                    </a:solidFill>
+                  </a:tcPr>
+                </a:tc>
+                <a:tc>
+                  <a:txBody>
+                    <a:bodyPr/>
+                    <a:p>
+                      <a:pPr>
+                        <a:defRPr/>
+                      </a:pPr>
+                      <a:endParaRPr/>
+                    </a:p>
+                  </a:txBody>
+                  <a:tcPr>
+                    <a:lnL w="28575" algn="ctr">
+                      <a:solidFill>
+                        <a:schemeClr val="accent1"/>
+                      </a:solidFill>
+                    </a:lnL>
+                    <a:lnR w="28575" algn="ctr">
+                      <a:solidFill>
+                        <a:schemeClr val="accent1"/>
+                      </a:solidFill>
+                    </a:lnR>
+                    <a:lnT w="28575" algn="ctr">
+                      <a:solidFill>
+                        <a:schemeClr val="tx2">
+                          <a:lumMod val="40000"/>
+                          <a:lumOff val="60000"/>
+                        </a:schemeClr>
+                      </a:solidFill>
+                    </a:lnT>
+                    <a:lnB w="28575" algn="ctr">
+                      <a:solidFill>
+                        <a:schemeClr val="accent1"/>
+                      </a:solidFill>
+                    </a:lnB>
+                  </a:tcPr>
+                </a:tc>
+                <a:tc>
+                  <a:txBody>
+                    <a:bodyPr/>
+                    <a:p>
+                      <a:pPr>
+                        <a:defRPr/>
+                      </a:pPr>
+                      <a:endParaRPr/>
+                    </a:p>
+                  </a:txBody>
+                  <a:tcPr>
+                    <a:lnL w="28575" algn="ctr">
+                      <a:solidFill>
+                        <a:schemeClr val="accent1"/>
+                      </a:solidFill>
+                    </a:lnL>
+                    <a:lnR w="28575" algn="ctr">
+                      <a:solidFill>
+                        <a:schemeClr val="tx2">
+                          <a:lumMod val="40000"/>
+                          <a:lumOff val="60000"/>
+                        </a:schemeClr>
+                      </a:solidFill>
+                    </a:lnR>
+                    <a:lnT w="28575" algn="ctr">
+                      <a:solidFill>
+                        <a:schemeClr val="tx2">
+                          <a:lumMod val="40000"/>
+                          <a:lumOff val="60000"/>
+                        </a:schemeClr>
+                      </a:solidFill>
+                    </a:lnT>
+                    <a:lnB w="28575" algn="ctr">
+                      <a:solidFill>
+                        <a:schemeClr val="tx2">
+                          <a:lumMod val="40000"/>
+                          <a:lumOff val="60000"/>
+                        </a:schemeClr>
+                      </a:solidFill>
+                    </a:lnB>
+                  </a:tcPr>
+                </a:tc>
+              </a:tr>
+            </a:tbl>
+          </a:graphicData>
+        </a:graphic>
+      </p:graphicFrame>
+      <p:sp>
+        <p:nvSpPr>
+          <p:cNvPr id="1734506407" name="" hidden="0"/>
+          <p:cNvSpPr/>
+          <p:nvPr isPhoto="0" userDrawn="0"/>
+        </p:nvSpPr>
+        <p:spPr bwMode="auto">
+          <a:xfrm rot="5399978" flipH="0" flipV="0">
+            <a:off x="1945338" y="664952"/>
+            <a:ext cx="826697" cy="467263"/>
+          </a:xfrm>
+          <a:prstGeom prst="rightArrow">
+            <a:avLst>
+              <a:gd name="adj1" fmla="val 50000"/>
+              <a:gd name="adj2" fmla="val 46681"/>
+            </a:avLst>
+          </a:prstGeom>
+        </p:spPr>
+        <p:style>
+          <a:lnRef idx="2">
+            <a:schemeClr val="accent1">
+              <a:shade val="50000"/>
+            </a:schemeClr>
+          </a:lnRef>
+          <a:fillRef idx="1">
+            <a:schemeClr val="accent1"/>
+          </a:fillRef>
+          <a:effectRef idx="0">
+            <a:schemeClr val="accent1"/>
+          </a:effectRef>
+          <a:fontRef idx="minor">
+            <a:schemeClr val="lt1"/>
+          </a:fontRef>
+        </p:style>
+      </p:sp>
+      <p:sp>
+        <p:nvSpPr>
+          <p:cNvPr id="1067922288" name="" hidden="0"/>
+          <p:cNvSpPr txBox="1"/>
+          <p:nvPr isPhoto="0" userDrawn="0"/>
+        </p:nvSpPr>
+        <p:spPr bwMode="auto">
+          <a:xfrm flipH="0" flipV="0">
+            <a:off x="2031998" y="119439"/>
+            <a:ext cx="716496" cy="365795"/>
+          </a:xfrm>
+          <a:prstGeom prst="rect">
+            <a:avLst/>
+          </a:prstGeom>
+          <a:noFill/>
+        </p:spPr>
+        <p:txBody>
+          <a:bodyPr vertOverflow="overflow" horzOverflow="clip" vert="horz" wrap="none" lIns="91440" tIns="45720" rIns="91440" bIns="45720" numCol="1" spcCol="0" rtlCol="0" fromWordArt="0" anchor="t" anchorCtr="0" forceAA="0" upright="0" compatLnSpc="0">
+            <a:spAutoFit/>
+          </a:bodyPr>
+          <a:p>
+            <a:pPr>
+              <a:defRPr/>
+            </a:pPr>
+            <a:r>
+              <a:rPr/>
+              <a:t>arr[0]</a:t>
+            </a:r>
+            <a:endParaRPr/>
+          </a:p>
+        </p:txBody>
+      </p:sp>
+      <p:sp>
+        <p:nvSpPr>
+          <p:cNvPr id="1960633582" name="" hidden="0"/>
+          <p:cNvSpPr/>
+          <p:nvPr isPhoto="0" userDrawn="0"/>
+        </p:nvSpPr>
+        <p:spPr bwMode="auto">
+          <a:xfrm rot="5399978" flipH="0" flipV="0">
+            <a:off x="3488316" y="724618"/>
+            <a:ext cx="826697" cy="467263"/>
+          </a:xfrm>
+          <a:prstGeom prst="rightArrow">
+            <a:avLst>
+              <a:gd name="adj1" fmla="val 50000"/>
+              <a:gd name="adj2" fmla="val 50000"/>
+            </a:avLst>
+          </a:prstGeom>
+        </p:spPr>
+        <p:style>
+          <a:lnRef idx="2">
+            <a:schemeClr val="accent1">
+              <a:shade val="50000"/>
+            </a:schemeClr>
+          </a:lnRef>
+          <a:fillRef idx="1">
+            <a:schemeClr val="accent1"/>
+          </a:fillRef>
+          <a:effectRef idx="0">
+            <a:schemeClr val="accent1"/>
+          </a:effectRef>
+          <a:fontRef idx="minor">
+            <a:schemeClr val="lt1"/>
+          </a:fontRef>
+        </p:style>
+      </p:sp>
+      <p:sp>
+        <p:nvSpPr>
+          <p:cNvPr id="563932061" name="" hidden="0"/>
+          <p:cNvSpPr/>
+          <p:nvPr isPhoto="0" userDrawn="0"/>
+        </p:nvSpPr>
+        <p:spPr bwMode="auto">
+          <a:xfrm rot="16199969" flipH="0" flipV="0">
+            <a:off x="4638505" y="1964486"/>
+            <a:ext cx="377404" cy="754810"/>
+          </a:xfrm>
+          <a:prstGeom prst="upArrow">
+            <a:avLst>
+              <a:gd name="adj1" fmla="val 50000"/>
+              <a:gd name="adj2" fmla="val 50000"/>
+            </a:avLst>
+          </a:prstGeom>
+          <a:solidFill>
+            <a:schemeClr val="bg2">
+              <a:lumMod val="50000"/>
+            </a:schemeClr>
+          </a:solidFill>
+          <a:ln w="12700" cap="flat" cmpd="sng" algn="ctr">
+            <a:solidFill>
+              <a:schemeClr val="bg2">
+                <a:lumMod val="25098"/>
+              </a:schemeClr>
+            </a:solidFill>
+            <a:prstDash val="solid"/>
+            <a:miter/>
+          </a:ln>
+        </p:spPr>
+        <p:style>
+          <a:lnRef idx="2">
+            <a:schemeClr val="accent1">
+              <a:shade val="50000"/>
+            </a:schemeClr>
+          </a:lnRef>
+          <a:fillRef idx="1">
+            <a:schemeClr val="accent1"/>
+          </a:fillRef>
+          <a:effectRef idx="0">
+            <a:schemeClr val="accent1"/>
+          </a:effectRef>
+          <a:fontRef idx="minor">
+            <a:schemeClr val="lt1"/>
+          </a:fontRef>
+        </p:style>
+      </p:sp>
+      <p:sp>
+        <p:nvSpPr>
+          <p:cNvPr id="2134149336" name="" hidden="0"/>
+          <p:cNvSpPr txBox="1"/>
+          <p:nvPr isPhoto="0" userDrawn="0"/>
+        </p:nvSpPr>
+        <p:spPr bwMode="auto">
+          <a:xfrm flipH="0" flipV="0">
+            <a:off x="5384237" y="2164798"/>
+            <a:ext cx="1974569" cy="365795"/>
+          </a:xfrm>
+          <a:prstGeom prst="rect">
+            <a:avLst/>
+          </a:prstGeom>
+          <a:noFill/>
+        </p:spPr>
+        <p:txBody>
+          <a:bodyPr vertOverflow="overflow" horzOverflow="clip" vert="horz" wrap="none" lIns="91440" tIns="45720" rIns="91440" bIns="45720" numCol="1" spcCol="0" rtlCol="0" fromWordArt="0" anchor="t" anchorCtr="0" forceAA="0" upright="0" compatLnSpc="0">
+            <a:spAutoFit/>
+          </a:bodyPr>
+          <a:p>
+            <a:pPr>
+              <a:defRPr/>
+            </a:pPr>
+            <a:r>
+              <a:rPr/>
+              <a:t>arr[3][1]; x=3, y=1</a:t>
+            </a:r>
+            <a:endParaRPr/>
+          </a:p>
+        </p:txBody>
+      </p:sp>
+      <p:sp>
+        <p:nvSpPr>
+          <p:cNvPr id="1123134409" name="" hidden="0"/>
+          <p:cNvSpPr txBox="1"/>
+          <p:nvPr isPhoto="0" userDrawn="0"/>
+        </p:nvSpPr>
+        <p:spPr bwMode="auto">
+          <a:xfrm flipH="0" flipV="0">
+            <a:off x="3595536" y="119439"/>
+            <a:ext cx="716496" cy="365795"/>
+          </a:xfrm>
+          <a:prstGeom prst="rect">
+            <a:avLst/>
+          </a:prstGeom>
+          <a:noFill/>
+        </p:spPr>
+        <p:txBody>
+          <a:bodyPr vertOverflow="overflow" horzOverflow="clip" vert="horz" wrap="none" lIns="91440" tIns="45720" rIns="91440" bIns="45720" numCol="1" spcCol="0" rtlCol="0" fromWordArt="0" anchor="t" anchorCtr="0" forceAA="0" upright="0" compatLnSpc="0">
+            <a:spAutoFit/>
+          </a:bodyPr>
+          <a:p>
+            <a:pPr>
+              <a:defRPr/>
+            </a:pPr>
+            <a:r>
+              <a:rPr/>
+              <a:t>arr[3]</a:t>
+            </a:r>
+            <a:endParaRPr/>
+          </a:p>
+        </p:txBody>
+      </p:sp>
+      <p:sp>
+        <p:nvSpPr>
+          <p:cNvPr id="161457067" name="" hidden="0"/>
+          <p:cNvSpPr/>
+          <p:nvPr isPhoto="0" userDrawn="0"/>
+        </p:nvSpPr>
+        <p:spPr bwMode="auto">
+          <a:xfrm flipH="0" flipV="0">
+            <a:off x="1583348" y="1006414"/>
+            <a:ext cx="3989716" cy="772782"/>
+          </a:xfrm>
+          <a:prstGeom prst="rightArrow">
+            <a:avLst>
+              <a:gd name="adj1" fmla="val 50000"/>
+              <a:gd name="adj2" fmla="val 50000"/>
+            </a:avLst>
+          </a:prstGeom>
+          <a:solidFill>
+            <a:schemeClr val="accent1">
+              <a:alpha val="57000"/>
+            </a:schemeClr>
+          </a:solidFill>
+        </p:spPr>
+        <p:style>
+          <a:lnRef idx="2">
+            <a:schemeClr val="accent1">
+              <a:shade val="50000"/>
+            </a:schemeClr>
+          </a:lnRef>
+          <a:fillRef idx="1">
+            <a:schemeClr val="accent1"/>
+          </a:fillRef>
+          <a:effectRef idx="0">
+            <a:schemeClr val="accent1"/>
+          </a:effectRef>
+          <a:fontRef idx="minor">
+            <a:schemeClr val="lt1"/>
+          </a:fontRef>
+        </p:style>
+      </p:sp>
+      <p:sp>
+        <p:nvSpPr>
+          <p:cNvPr id="934876076" name="" hidden="0"/>
+          <p:cNvSpPr txBox="1"/>
+          <p:nvPr isPhoto="0" userDrawn="0"/>
+        </p:nvSpPr>
+        <p:spPr bwMode="auto">
+          <a:xfrm flipH="0" flipV="0">
+            <a:off x="1143042" y="1051542"/>
+            <a:ext cx="411550" cy="640115"/>
+          </a:xfrm>
+          <a:prstGeom prst="rect">
+            <a:avLst/>
+          </a:prstGeom>
+          <a:noFill/>
+        </p:spPr>
+        <p:txBody>
+          <a:bodyPr vertOverflow="overflow" horzOverflow="clip" vert="horz" wrap="none" lIns="91440" tIns="45720" rIns="91440" bIns="45720" numCol="1" spcCol="0" rtlCol="0" fromWordArt="0" anchor="t" anchorCtr="0" forceAA="0" upright="0" compatLnSpc="0">
+            <a:spAutoFit/>
+          </a:bodyPr>
+          <a:p>
+            <a:pPr>
+              <a:defRPr/>
+            </a:pPr>
+            <a:r>
+              <a:rPr sz="3600">
+                <a:solidFill>
+                  <a:schemeClr val="accent1"/>
+                </a:solidFill>
+              </a:rPr>
+              <a:t>x</a:t>
+            </a:r>
+            <a:endParaRPr sz="3600">
+              <a:solidFill>
+                <a:schemeClr val="accent1"/>
+              </a:solidFill>
+            </a:endParaRPr>
+          </a:p>
+        </p:txBody>
+      </p:sp>
+      <p:sp>
+        <p:nvSpPr>
+          <p:cNvPr id="2039237233" name="" hidden="0"/>
+          <p:cNvSpPr/>
+          <p:nvPr isPhoto="0" userDrawn="0"/>
+        </p:nvSpPr>
+        <p:spPr bwMode="auto">
+          <a:xfrm rot="5399978" flipH="0" flipV="0">
+            <a:off x="2194354" y="2632853"/>
+            <a:ext cx="3414622" cy="772782"/>
+          </a:xfrm>
+          <a:prstGeom prst="rightArrow">
+            <a:avLst>
+              <a:gd name="adj1" fmla="val 50000"/>
+              <a:gd name="adj2" fmla="val 50000"/>
+            </a:avLst>
+          </a:prstGeom>
+          <a:solidFill>
+            <a:schemeClr val="bg2">
+              <a:lumMod val="50000"/>
+              <a:alpha val="57000"/>
+            </a:schemeClr>
+          </a:solidFill>
+          <a:ln w="12700" cap="flat" cmpd="sng" algn="ctr">
+            <a:solidFill>
+              <a:schemeClr val="bg2">
+                <a:lumMod val="50196"/>
+              </a:schemeClr>
+            </a:solidFill>
+            <a:prstDash val="solid"/>
+            <a:miter/>
+          </a:ln>
+        </p:spPr>
+        <p:style>
+          <a:lnRef idx="2">
+            <a:schemeClr val="accent1">
+              <a:shade val="50000"/>
+            </a:schemeClr>
+          </a:lnRef>
+          <a:fillRef idx="1">
+            <a:schemeClr val="accent1"/>
+          </a:fillRef>
+          <a:effectRef idx="0">
+            <a:schemeClr val="accent1"/>
+          </a:effectRef>
+          <a:fontRef idx="minor">
+            <a:schemeClr val="lt1"/>
+          </a:fontRef>
+        </p:style>
+      </p:sp>
+      <p:sp>
+        <p:nvSpPr>
+          <p:cNvPr id="578196358" name="" hidden="0"/>
+          <p:cNvSpPr txBox="1"/>
+          <p:nvPr isPhoto="0" userDrawn="0"/>
+        </p:nvSpPr>
+        <p:spPr bwMode="auto">
+          <a:xfrm flipH="0" flipV="0">
+            <a:off x="3759401" y="4825598"/>
+            <a:ext cx="411550" cy="640115"/>
+          </a:xfrm>
+          <a:prstGeom prst="rect">
+            <a:avLst/>
+          </a:prstGeom>
+          <a:noFill/>
+        </p:spPr>
+        <p:txBody>
+          <a:bodyPr vertOverflow="overflow" horzOverflow="clip" vert="horz" wrap="none" lIns="91440" tIns="45720" rIns="91440" bIns="45720" numCol="1" spcCol="0" rtlCol="0" fromWordArt="0" anchor="t" anchorCtr="0" forceAA="0" upright="0" compatLnSpc="0">
+            <a:spAutoFit/>
+          </a:bodyPr>
+          <a:p>
+            <a:pPr>
+              <a:defRPr/>
+            </a:pPr>
+            <a:r>
+              <a:rPr sz="3600">
+                <a:solidFill>
+                  <a:schemeClr val="accent1"/>
+                </a:solidFill>
+              </a:rPr>
+              <a:t>y</a:t>
+            </a:r>
+            <a:endParaRPr sz="3600">
+              <a:solidFill>
+                <a:schemeClr val="accent1"/>
+              </a:solidFill>
+            </a:endParaRPr>
+          </a:p>
+        </p:txBody>
+      </p:sp>
+    </p:spTree>
+  </p:cSld>
+  <p:clrMapOvr>
+    <a:masterClrMapping/>
+  </p:clrMapOvr>
+  <mc:AlternateContent xmlns:mc="http://schemas.openxmlformats.org/markup-compatibility/2006">
+    <mc:Choice xmlns:p14="http://schemas.microsoft.com/office/powerpoint/2010/main" Requires="p14">
+      <p:transition p14:dur="2000" advClick="1"/>
+    </mc:Choice>
+    <mc:Fallback>
+      <p:transition advClick="1"/>
+    </mc:Fallback>
+  </mc:AlternateContent>
+</p:sld>
+</file>
+
+<file path=ppt/slides/slide3.xml><?xml version="1.0" encoding="utf-8"?>
+<p:sld xmlns:a="http://schemas.openxmlformats.org/drawingml/2006/main" xmlns:r="http://schemas.openxmlformats.org/officeDocument/2006/relationships" xmlns:p="http://schemas.openxmlformats.org/presentationml/2006/main" xmlns:m="http://schemas.openxmlformats.org/officeDocument/2006/math" xmlns:w="http://schemas.openxmlformats.org/wordprocessingml/2006/main" showMasterPhAnim="0" show="1">
+  <p:cSld name="">
+    <p:spTree>
+      <p:nvGrpSpPr>
+        <p:cNvPr id="1" name="" hidden="0"/>
+        <p:cNvGrpSpPr/>
+        <p:nvPr isPhoto="0" userDrawn="0"/>
+      </p:nvGrpSpPr>
+      <p:grpSpPr bwMode="auto">
+        <a:xfrm>
+          <a:off x="0" y="0"/>
+          <a:ext cx="0" cy="0"/>
+          <a:chOff x="0" y="0"/>
+          <a:chExt cx="0" cy="0"/>
+        </a:xfrm>
+      </p:grpSpPr>
+      <p:graphicFrame>
+        <p:nvGraphicFramePr>
+          <p:cNvPr id="537716439" name="" hidden="0"/>
+          <p:cNvGraphicFramePr>
+            <a:graphicFrameLocks xmlns:a="http://schemas.openxmlformats.org/drawingml/2006/main"/>
+          </p:cNvGraphicFramePr>
+          <p:nvPr isPhoto="0" userDrawn="0"/>
+        </p:nvGraphicFramePr>
+        <p:xfrm>
+          <a:off x="2031998" y="1371600"/>
+          <a:ext cx="8127999" cy="1346087"/>
+        </p:xfrm>
+        <a:graphic>
+          <a:graphicData uri="http://schemas.openxmlformats.org/drawingml/2006/table">
+            <a:tbl>
+              <a:tblPr firstRow="1" firstCol="0" lastRow="0" lastCol="0" bandRow="1" bandCol="0">
+                <a:tableStyleId>{4BB817D8-150B-0955-7231-5E8E44D49D6B}</a:tableStyleId>
+              </a:tblPr>
+              <a:tblGrid>
+                <a:gridCol w="540000"/>
+                <a:gridCol w="540000"/>
+                <a:gridCol w="540000"/>
+                <a:gridCol w="540000"/>
+                <a:gridCol w="540000"/>
+              </a:tblGrid>
+              <a:tr h="644136">
                 <a:tc>
                   <a:txBody>
                     <a:bodyPr/>
@@ -3285,7 +6173,7 @@
                   <a:tcPr/>
                 </a:tc>
               </a:tr>
-              <a:tr h="644138">
+              <a:tr h="644136">
                 <a:tc>
                   <a:txBody>
                     <a:bodyPr/>
@@ -3353,7 +6241,7 @@
                   <a:tcPr/>
                 </a:tc>
               </a:tr>
-              <a:tr h="644138">
+              <a:tr h="644136">
                 <a:tc>
                   <a:txBody>
                     <a:bodyPr/>
@@ -3415,7 +6303,7 @@
                   <a:tcPr/>
                 </a:tc>
               </a:tr>
-              <a:tr h="644138">
+              <a:tr h="644136">
                 <a:tc>
                   <a:txBody>
                     <a:bodyPr/>
@@ -3477,7 +6365,7 @@
                   <a:tcPr/>
                 </a:tc>
               </a:tr>
-              <a:tr h="644138">
+              <a:tr h="644136">
                 <a:tc>
                   <a:txBody>
                     <a:bodyPr/>
@@ -3551,7 +6439,7 @@
       </p:graphicFrame>
       <p:cxnSp>
         <p:nvCxnSpPr>
-          <p:cNvPr id="0" name="" hidden="0"/>
+          <p:cNvPr id="1015652834" name="" hidden="0"/>
           <p:cNvCxnSpPr>
             <a:cxnSpLocks/>
           </p:cNvCxnSpPr>
@@ -3559,8 +6447,8 @@
         </p:nvCxnSpPr>
         <p:spPr bwMode="auto">
           <a:xfrm flipH="0" flipV="0">
-            <a:off x="1619292" y="970111"/>
-            <a:ext cx="3756084" cy="0"/>
+            <a:off x="1619291" y="970110"/>
+            <a:ext cx="3756083" cy="0"/>
           </a:xfrm>
           <a:prstGeom prst="line">
             <a:avLst/>
@@ -3588,7 +6476,7 @@
       </p:cxnSp>
       <p:cxnSp>
         <p:nvCxnSpPr>
-          <p:cNvPr id="1385618531" name="" hidden="0"/>
+          <p:cNvPr id="1581905808" name="" hidden="0"/>
           <p:cNvCxnSpPr>
             <a:cxnSpLocks/>
           </p:cNvCxnSpPr>
@@ -3596,8 +6484,8 @@
         </p:nvCxnSpPr>
         <p:spPr bwMode="auto">
           <a:xfrm flipH="0" flipV="0">
-            <a:off x="1619291" y="970111"/>
-            <a:ext cx="0" cy="4205737"/>
+            <a:off x="1619290" y="970110"/>
+            <a:ext cx="0" cy="4205736"/>
           </a:xfrm>
           <a:prstGeom prst="line">
             <a:avLst/>
@@ -3625,14 +6513,14 @@
       </p:cxnSp>
       <p:sp>
         <p:nvSpPr>
-          <p:cNvPr id="766026424" name="" hidden="0"/>
+          <p:cNvPr id="907534238" name="" hidden="0"/>
           <p:cNvSpPr txBox="1"/>
           <p:nvPr isPhoto="0" userDrawn="0"/>
         </p:nvSpPr>
         <p:spPr bwMode="auto">
           <a:xfrm flipH="0" flipV="0">
-            <a:off x="2122499" y="1078301"/>
-            <a:ext cx="2857572" cy="365795"/>
+            <a:off x="2122498" y="1078300"/>
+            <a:ext cx="2857571" cy="365794"/>
           </a:xfrm>
           <a:prstGeom prst="rect">
             <a:avLst/>
@@ -3657,14 +6545,14 @@
       </p:sp>
       <p:sp>
         <p:nvSpPr>
-          <p:cNvPr id="182572605" name="" hidden="0"/>
+          <p:cNvPr id="943766300" name="" hidden="0"/>
           <p:cNvSpPr txBox="1"/>
           <p:nvPr isPhoto="0" userDrawn="0"/>
         </p:nvSpPr>
         <p:spPr bwMode="auto">
           <a:xfrm flipH="0" flipV="0">
-            <a:off x="1673206" y="1563536"/>
-            <a:ext cx="359945" cy="2880395"/>
+            <a:off x="1673205" y="1563535"/>
+            <a:ext cx="359944" cy="2880394"/>
           </a:xfrm>
           <a:prstGeom prst="rect">
             <a:avLst/>
@@ -3754,14 +6642,14 @@
       </p:sp>
       <p:sp>
         <p:nvSpPr>
-          <p:cNvPr id="1960007190" name="" hidden="0"/>
+          <p:cNvPr id="330802629" name="" hidden="0"/>
           <p:cNvSpPr txBox="1"/>
           <p:nvPr isPhoto="0" userDrawn="0"/>
         </p:nvSpPr>
         <p:spPr bwMode="auto">
           <a:xfrm flipH="0" flipV="0">
-            <a:off x="5375377" y="787213"/>
-            <a:ext cx="297251" cy="365795"/>
+            <a:off x="5375376" y="787212"/>
+            <a:ext cx="297250" cy="365794"/>
           </a:xfrm>
           <a:prstGeom prst="rect">
             <a:avLst/>
@@ -3786,14 +6674,14 @@
       </p:sp>
       <p:sp>
         <p:nvSpPr>
-          <p:cNvPr id="1888899504" name="" hidden="0"/>
+          <p:cNvPr id="1250757232" name="" hidden="0"/>
           <p:cNvSpPr txBox="1"/>
           <p:nvPr isPhoto="0" userDrawn="0"/>
         </p:nvSpPr>
         <p:spPr bwMode="auto">
           <a:xfrm flipH="0" flipV="0">
-            <a:off x="1470665" y="5262164"/>
-            <a:ext cx="297251" cy="365795"/>
+            <a:off x="1470664" y="5262163"/>
+            <a:ext cx="297250" cy="365794"/>
           </a:xfrm>
           <a:prstGeom prst="rect">
             <a:avLst/>
@@ -3832,7 +6720,157 @@
 </p:sld>
 </file>
 
-<file path=ppt/slides/slide2.xml><?xml version="1.0" encoding="utf-8"?>
+<file path=ppt/slides/slide4.xml><?xml version="1.0" encoding="utf-8"?>
+<p:sld xmlns:a="http://schemas.openxmlformats.org/drawingml/2006/main" xmlns:r="http://schemas.openxmlformats.org/officeDocument/2006/relationships" xmlns:p="http://schemas.openxmlformats.org/presentationml/2006/main" xmlns:m="http://schemas.openxmlformats.org/officeDocument/2006/math" xmlns:w="http://schemas.openxmlformats.org/wordprocessingml/2006/main" showMasterPhAnim="0" show="1">
+  <p:cSld name="">
+    <p:spTree>
+      <p:nvGrpSpPr>
+        <p:cNvPr id="1" name="" hidden="0"/>
+        <p:cNvGrpSpPr/>
+        <p:nvPr isPhoto="0" userDrawn="0"/>
+      </p:nvGrpSpPr>
+      <p:grpSpPr bwMode="auto">
+        <a:xfrm>
+          <a:off x="0" y="0"/>
+          <a:ext cx="0" cy="0"/>
+          <a:chOff x="0" y="0"/>
+          <a:chExt cx="0" cy="0"/>
+        </a:xfrm>
+      </p:grpSpPr>
+      <p:pic>
+        <p:nvPicPr>
+          <p:cNvPr id="1451208059" name="" hidden="0"/>
+          <p:cNvPicPr>
+            <a:picLocks noChangeAspect="1"/>
+          </p:cNvPicPr>
+          <p:nvPr isPhoto="0" userDrawn="0"/>
+        </p:nvPicPr>
+        <p:blipFill>
+          <a:blip r:embed="rId2"/>
+          <a:stretch/>
+        </p:blipFill>
+        <p:spPr bwMode="auto">
+          <a:xfrm>
+            <a:off x="769907" y="239652"/>
+            <a:ext cx="9753599" cy="6486525"/>
+          </a:xfrm>
+          <a:prstGeom prst="rect">
+            <a:avLst/>
+          </a:prstGeom>
+        </p:spPr>
+      </p:pic>
+      <p:sp>
+        <p:nvSpPr>
+          <p:cNvPr id="333268287" name="" hidden="0"/>
+          <p:cNvSpPr/>
+          <p:nvPr isPhoto="0" userDrawn="0"/>
+        </p:nvSpPr>
+        <p:spPr bwMode="auto">
+          <a:xfrm flipH="0" flipV="0">
+            <a:off x="1049331" y="-418027"/>
+            <a:ext cx="78455" cy="365795"/>
+          </a:xfrm>
+        </p:spPr>
+        <p:txBody>
+          <a:bodyPr rot="0" spcFirstLastPara="0" vertOverflow="overflow" horzOverflow="clip" vert="horz" wrap="square" lIns="91440" tIns="45720" rIns="91440" bIns="45720" numCol="1" spcCol="0" rtlCol="0" fromWordArt="0" anchor="t" anchorCtr="0" forceAA="0" upright="0" compatLnSpc="1">
+            <a:prstTxWarp prst="textNoShape"/>
+            <a:spAutoFit/>
+          </a:bodyPr>
+          <a:p>
+            <a:pPr>
+              <a:defRPr/>
+            </a:pPr>
+            <a:endParaRPr/>
+          </a:p>
+        </p:txBody>
+      </p:sp>
+      <p:pic>
+        <p:nvPicPr>
+          <p:cNvPr id="1510578278" name="" hidden="0"/>
+          <p:cNvPicPr>
+            <a:picLocks noChangeAspect="1"/>
+          </p:cNvPicPr>
+          <p:nvPr isPhoto="0" userDrawn="0"/>
+        </p:nvPicPr>
+        <p:blipFill>
+          <a:blip r:embed="rId3"/>
+          <a:stretch/>
+        </p:blipFill>
+        <p:spPr bwMode="auto">
+          <a:xfrm flipH="0" flipV="0">
+            <a:off x="948847" y="482357"/>
+            <a:ext cx="4442416" cy="3235983"/>
+          </a:xfrm>
+          <a:prstGeom prst="rect">
+            <a:avLst/>
+          </a:prstGeom>
+        </p:spPr>
+      </p:pic>
+      <p:sp>
+        <p:nvSpPr>
+          <p:cNvPr id="900823032" name="" hidden="0"/>
+          <p:cNvSpPr/>
+          <p:nvPr isPhoto="0" userDrawn="0"/>
+        </p:nvSpPr>
+        <p:spPr bwMode="auto">
+          <a:xfrm flipH="0" flipV="0">
+            <a:off x="948847" y="482357"/>
+            <a:ext cx="4442416" cy="3235983"/>
+          </a:xfrm>
+          <a:prstGeom prst="borderCallout1">
+            <a:avLst>
+              <a:gd name="adj1" fmla="val 38964"/>
+              <a:gd name="adj2" fmla="val 104496"/>
+              <a:gd name="adj3" fmla="val 64511"/>
+              <a:gd name="adj4" fmla="val 128365"/>
+            </a:avLst>
+          </a:prstGeom>
+          <a:noFill/>
+          <a:ln w="38099" cap="flat" cmpd="sng" algn="ctr">
+            <a:solidFill>
+              <a:schemeClr val="tx1">
+                <a:lumMod val="85098"/>
+                <a:lumOff val="14902"/>
+              </a:schemeClr>
+            </a:solidFill>
+            <a:prstDash val="solid"/>
+            <a:miter/>
+          </a:ln>
+        </p:spPr>
+        <p:style>
+          <a:lnRef idx="2">
+            <a:schemeClr val="accent1">
+              <a:shade val="50000"/>
+            </a:schemeClr>
+          </a:lnRef>
+          <a:fillRef idx="1">
+            <a:schemeClr val="accent1"/>
+          </a:fillRef>
+          <a:effectRef idx="0">
+            <a:schemeClr val="accent1"/>
+          </a:effectRef>
+          <a:fontRef idx="minor">
+            <a:schemeClr val="lt1"/>
+          </a:fontRef>
+        </p:style>
+      </p:sp>
+    </p:spTree>
+  </p:cSld>
+  <p:clrMapOvr>
+    <a:masterClrMapping/>
+  </p:clrMapOvr>
+  <mc:AlternateContent xmlns:mc="http://schemas.openxmlformats.org/markup-compatibility/2006">
+    <mc:Choice xmlns:p14="http://schemas.microsoft.com/office/powerpoint/2010/main" Requires="p14">
+      <p:transition p14:dur="2000" advClick="1"/>
+    </mc:Choice>
+    <mc:Fallback>
+      <p:transition advClick="1"/>
+    </mc:Fallback>
+  </mc:AlternateContent>
+</p:sld>
+</file>
+
+<file path=ppt/slides/slide5.xml><?xml version="1.0" encoding="utf-8"?>
 <p:sld xmlns:a="http://schemas.openxmlformats.org/drawingml/2006/main" xmlns:r="http://schemas.openxmlformats.org/officeDocument/2006/relationships" xmlns:p="http://schemas.openxmlformats.org/presentationml/2006/main" xmlns:m="http://schemas.openxmlformats.org/officeDocument/2006/math" xmlns:w="http://schemas.openxmlformats.org/wordprocessingml/2006/main" showMasterPhAnim="0" show="1">
   <p:cSld name="">
     <p:spTree>
@@ -4184,7 +7222,7 @@
 </p:sld>
 </file>
 
-<file path=ppt/slides/slide3.xml><?xml version="1.0" encoding="utf-8"?>
+<file path=ppt/slides/slide6.xml><?xml version="1.0" encoding="utf-8"?>
 <p:sld xmlns:a="http://schemas.openxmlformats.org/drawingml/2006/main" xmlns:r="http://schemas.openxmlformats.org/officeDocument/2006/relationships" xmlns:p="http://schemas.openxmlformats.org/presentationml/2006/main" xmlns:m="http://schemas.openxmlformats.org/officeDocument/2006/math" xmlns:w="http://schemas.openxmlformats.org/wordprocessingml/2006/main" showMasterPhAnim="0" show="1">
   <p:cSld name="">
     <p:spTree>

</xml_diff>

<commit_message>
many backend changes, cleanups, bugfixes, tested
</commit_message>
<xml_diff>
--- a/docs/source/_images/processing/templates.pptx
+++ b/docs/source/_images/processing/templates.pptx
@@ -3224,7 +3224,7 @@
           <a:graphicData uri="http://schemas.openxmlformats.org/drawingml/2006/table">
             <a:tbl>
               <a:tblPr firstRow="1" firstCol="0" lastRow="0" lastCol="0" bandRow="1" bandCol="0">
-                <a:tableStyleId>{4BB817D8-150B-0955-7231-5E8E44D49D6B}</a:tableStyleId>
+                <a:tableStyleId>{6DACF13F-7D56-5426-5DBF-6772FC64968B}</a:tableStyleId>
               </a:tblPr>
               <a:tblGrid>
                 <a:gridCol w="540000"/>
@@ -4623,7 +4623,7 @@
           <a:graphicData uri="http://schemas.openxmlformats.org/drawingml/2006/table">
             <a:tbl>
               <a:tblPr firstRow="1" firstCol="0" lastRow="0" lastCol="0" bandRow="1" bandCol="0">
-                <a:tableStyleId>{4BB817D8-150B-0955-7231-5E8E44D49D6B}</a:tableStyleId>
+                <a:tableStyleId>{6DACF13F-7D56-5426-5DBF-6772FC64968B}</a:tableStyleId>
               </a:tblPr>
               <a:tblGrid>
                 <a:gridCol w="540000"/>
@@ -6040,7 +6040,9 @@
             <a:r>
               <a:rPr sz="3600">
                 <a:solidFill>
-                  <a:schemeClr val="accent1"/>
+                  <a:schemeClr val="bg2">
+                    <a:lumMod val="50000"/>
+                  </a:schemeClr>
                 </a:solidFill>
               </a:rPr>
               <a:t>y</a:t>
@@ -6102,7 +6104,7 @@
           <a:graphicData uri="http://schemas.openxmlformats.org/drawingml/2006/table">
             <a:tbl>
               <a:tblPr firstRow="1" firstCol="0" lastRow="0" lastCol="0" bandRow="1" bandCol="0">
-                <a:tableStyleId>{4BB817D8-150B-0955-7231-5E8E44D49D6B}</a:tableStyleId>
+                <a:tableStyleId>{6DACF13F-7D56-5426-5DBF-6772FC64968B}</a:tableStyleId>
               </a:tblPr>
               <a:tblGrid>
                 <a:gridCol w="540000"/>

</xml_diff>